<commit_message>
added break and continue examples
</commit_message>
<xml_diff>
--- a/slides/03_arrays_loops.pptx
+++ b/slides/03_arrays_loops.pptx
@@ -18,6 +18,7 @@
     <p:sldId id="263" r:id="rId13"/>
     <p:sldId id="264" r:id="rId14"/>
     <p:sldId id="265" r:id="rId15"/>
+    <p:sldId id="266" r:id="rId16"/>
   </p:sldIdLst>
   <p:sldSz cy="5143500" cx="9144000"/>
   <p:notesSz cx="6858000" cy="9144000"/>
@@ -952,7 +953,7 @@
   <p:cSld>
     <p:spTree>
       <p:nvGrpSpPr>
-        <p:cNvPr id="156" name="Shape 156"/>
+        <p:cNvPr id="159" name="Shape 159"/>
         <p:cNvGrpSpPr/>
         <p:nvPr/>
       </p:nvGrpSpPr>
@@ -966,7 +967,7 @@
       </p:grpSpPr>
       <p:sp>
         <p:nvSpPr>
-          <p:cNvPr id="157" name="Google Shape;157;p12:notes"/>
+          <p:cNvPr id="160" name="Google Shape;160;p11:notes"/>
           <p:cNvSpPr/>
           <p:nvPr>
             <p:ph idx="2" type="sldImg"/>
@@ -1011,7 +1012,124 @@
       </p:sp>
       <p:sp>
         <p:nvSpPr>
-          <p:cNvPr id="158" name="Google Shape;158;p12:notes"/>
+          <p:cNvPr id="161" name="Google Shape;161;p11:notes"/>
+          <p:cNvSpPr txBox="1"/>
+          <p:nvPr>
+            <p:ph idx="1" type="body"/>
+          </p:nvPr>
+        </p:nvSpPr>
+        <p:spPr>
+          <a:xfrm>
+            <a:off x="685800" y="4343400"/>
+            <a:ext cx="5486400" cy="4114800"/>
+          </a:xfrm>
+          <a:prstGeom prst="rect">
+            <a:avLst/>
+          </a:prstGeom>
+          <a:noFill/>
+          <a:ln>
+            <a:noFill/>
+          </a:ln>
+        </p:spPr>
+        <p:txBody>
+          <a:bodyPr anchorCtr="0" anchor="t" bIns="91425" lIns="91425" spcFirstLastPara="1" rIns="91425" wrap="square" tIns="91425">
+            <a:noAutofit/>
+          </a:bodyPr>
+          <a:lstStyle/>
+          <a:p>
+            <a:pPr indent="0" lvl="0" marL="0" rtl="0" algn="l">
+              <a:lnSpc>
+                <a:spcPct val="100000"/>
+              </a:lnSpc>
+              <a:spcBef>
+                <a:spcPts val="0"/>
+              </a:spcBef>
+              <a:spcAft>
+                <a:spcPts val="0"/>
+              </a:spcAft>
+              <a:buSzPts val="1100"/>
+              <a:buNone/>
+            </a:pPr>
+            <a:r>
+              <a:t/>
+            </a:r>
+            <a:endParaRPr/>
+          </a:p>
+        </p:txBody>
+      </p:sp>
+    </p:spTree>
+  </p:cSld>
+  <p:clrMapOvr>
+    <a:masterClrMapping/>
+  </p:clrMapOvr>
+</p:notes>
+</file>
+
+<file path=ppt/notesSlides/notesSlide11.xml><?xml version="1.0" encoding="utf-8"?>
+<p:notes xmlns:a="http://schemas.openxmlformats.org/drawingml/2006/main" xmlns:r="http://schemas.openxmlformats.org/officeDocument/2006/relationships" xmlns:mc="http://schemas.openxmlformats.org/markup-compatibility/2006" xmlns:mv="urn:schemas-microsoft-com:mac:vml" xmlns:p="http://schemas.openxmlformats.org/presentationml/2006/main" xmlns:c="http://schemas.openxmlformats.org/drawingml/2006/chart" xmlns:dgm="http://schemas.openxmlformats.org/drawingml/2006/diagram" xmlns:o="urn:schemas-microsoft-com:office:office" xmlns:v="urn:schemas-microsoft-com:vml" xmlns:pvml="urn:schemas-microsoft-com:office:powerpoint" xmlns:com="http://schemas.openxmlformats.org/drawingml/2006/compatibility" xmlns:p14="http://schemas.microsoft.com/office/powerpoint/2010/main" xmlns:p15="http://schemas.microsoft.com/office/powerpoint/2012/main" xmlns:ahyp="http://schemas.microsoft.com/office/drawing/2018/hyperlinkcolor" showMasterPhAnim="0" showMasterSp="0">
+  <p:cSld>
+    <p:spTree>
+      <p:nvGrpSpPr>
+        <p:cNvPr id="165" name="Shape 165"/>
+        <p:cNvGrpSpPr/>
+        <p:nvPr/>
+      </p:nvGrpSpPr>
+      <p:grpSpPr>
+        <a:xfrm>
+          <a:off x="0" y="0"/>
+          <a:ext cx="0" cy="0"/>
+          <a:chOff x="0" y="0"/>
+          <a:chExt cx="0" cy="0"/>
+        </a:xfrm>
+      </p:grpSpPr>
+      <p:sp>
+        <p:nvSpPr>
+          <p:cNvPr id="166" name="Google Shape;166;p12:notes"/>
+          <p:cNvSpPr/>
+          <p:nvPr>
+            <p:ph idx="2" type="sldImg"/>
+          </p:nvPr>
+        </p:nvSpPr>
+        <p:spPr>
+          <a:xfrm>
+            <a:off x="381300" y="685800"/>
+            <a:ext cx="6096000" cy="3429000"/>
+          </a:xfrm>
+          <a:custGeom>
+            <a:rect b="b" l="l" r="r" t="t"/>
+            <a:pathLst>
+              <a:path extrusionOk="0" h="120000" w="120000">
+                <a:moveTo>
+                  <a:pt x="0" y="0"/>
+                </a:moveTo>
+                <a:lnTo>
+                  <a:pt x="120000" y="0"/>
+                </a:lnTo>
+                <a:lnTo>
+                  <a:pt x="120000" y="120000"/>
+                </a:lnTo>
+                <a:lnTo>
+                  <a:pt x="0" y="120000"/>
+                </a:lnTo>
+                <a:close/>
+              </a:path>
+            </a:pathLst>
+          </a:custGeom>
+          <a:noFill/>
+          <a:ln cap="flat" cmpd="sng" w="9525">
+            <a:solidFill>
+              <a:srgbClr val="000000"/>
+            </a:solidFill>
+            <a:prstDash val="solid"/>
+            <a:round/>
+            <a:headEnd len="sm" w="sm" type="none"/>
+            <a:tailEnd len="sm" w="sm" type="none"/>
+          </a:ln>
+        </p:spPr>
+      </p:sp>
+      <p:sp>
+        <p:nvSpPr>
+          <p:cNvPr id="167" name="Google Shape;167;p12:notes"/>
           <p:cNvSpPr txBox="1"/>
           <p:nvPr>
             <p:ph idx="1" type="body"/>
@@ -1888,7 +2006,7 @@
   <p:cSld>
     <p:spTree>
       <p:nvGrpSpPr>
-        <p:cNvPr id="150" name="Shape 150"/>
+        <p:cNvPr id="151" name="Shape 151"/>
         <p:cNvGrpSpPr/>
         <p:nvPr/>
       </p:nvGrpSpPr>
@@ -1902,7 +2020,7 @@
       </p:grpSpPr>
       <p:sp>
         <p:nvSpPr>
-          <p:cNvPr id="151" name="Google Shape;151;p11:notes"/>
+          <p:cNvPr id="152" name="Google Shape;152;g101b2d7b6c9_0_6:notes"/>
           <p:cNvSpPr/>
           <p:nvPr>
             <p:ph idx="2" type="sldImg"/>
@@ -1933,21 +2051,11 @@
               </a:path>
             </a:pathLst>
           </a:custGeom>
-          <a:noFill/>
-          <a:ln cap="flat" cmpd="sng" w="9525">
-            <a:solidFill>
-              <a:srgbClr val="000000"/>
-            </a:solidFill>
-            <a:prstDash val="solid"/>
-            <a:round/>
-            <a:headEnd len="sm" w="sm" type="none"/>
-            <a:tailEnd len="sm" w="sm" type="none"/>
-          </a:ln>
         </p:spPr>
       </p:sp>
       <p:sp>
         <p:nvSpPr>
-          <p:cNvPr id="152" name="Google Shape;152;p11:notes"/>
+          <p:cNvPr id="153" name="Google Shape;153;g101b2d7b6c9_0_6:notes"/>
           <p:cNvSpPr txBox="1"/>
           <p:nvPr>
             <p:ph idx="1" type="body"/>
@@ -1961,10 +2069,6 @@
           <a:prstGeom prst="rect">
             <a:avLst/>
           </a:prstGeom>
-          <a:noFill/>
-          <a:ln>
-            <a:noFill/>
-          </a:ln>
         </p:spPr>
         <p:txBody>
           <a:bodyPr anchorCtr="0" anchor="t" bIns="91425" lIns="91425" spcFirstLastPara="1" rIns="91425" wrap="square" tIns="91425">
@@ -1973,16 +2077,12 @@
           <a:lstStyle/>
           <a:p>
             <a:pPr indent="0" lvl="0" marL="0" rtl="0" algn="l">
-              <a:lnSpc>
-                <a:spcPct val="100000"/>
-              </a:lnSpc>
-              <a:spcBef>
-                <a:spcPts val="0"/>
-              </a:spcBef>
-              <a:spcAft>
-                <a:spcPts val="0"/>
-              </a:spcAft>
-              <a:buSzPts val="1100"/>
+              <a:spcBef>
+                <a:spcPts val="0"/>
+              </a:spcBef>
+              <a:spcAft>
+                <a:spcPts val="0"/>
+              </a:spcAft>
               <a:buNone/>
             </a:pPr>
             <a:r>
@@ -9916,7 +10016,7 @@
   <p:cSld>
     <p:spTree>
       <p:nvGrpSpPr>
-        <p:cNvPr id="159" name="Shape 159"/>
+        <p:cNvPr id="162" name="Shape 162"/>
         <p:cNvGrpSpPr/>
         <p:nvPr/>
       </p:nvGrpSpPr>
@@ -9930,7 +10030,7 @@
       </p:grpSpPr>
       <p:sp>
         <p:nvSpPr>
-          <p:cNvPr id="160" name="Google Shape;160;p25"/>
+          <p:cNvPr id="163" name="Google Shape;163;p25"/>
           <p:cNvSpPr txBox="1"/>
           <p:nvPr>
             <p:ph type="title"/>
@@ -9970,6 +10070,333 @@
             </a:pPr>
             <a:r>
               <a:rPr lang="de"/>
+              <a:t>4. Fragen</a:t>
+            </a:r>
+            <a:endParaRPr/>
+          </a:p>
+        </p:txBody>
+      </p:sp>
+      <p:sp>
+        <p:nvSpPr>
+          <p:cNvPr id="164" name="Google Shape;164;p25"/>
+          <p:cNvSpPr/>
+          <p:nvPr>
+            <p:ph idx="2" type="chart"/>
+          </p:nvPr>
+        </p:nvSpPr>
+        <p:spPr>
+          <a:xfrm>
+            <a:off x="431800" y="782241"/>
+            <a:ext cx="8375700" cy="3579000"/>
+          </a:xfrm>
+          <a:prstGeom prst="rect">
+            <a:avLst/>
+          </a:prstGeom>
+          <a:noFill/>
+          <a:ln>
+            <a:noFill/>
+          </a:ln>
+        </p:spPr>
+        <p:txBody>
+          <a:bodyPr anchorCtr="0" anchor="t" bIns="0" lIns="0" spcFirstLastPara="1" rIns="0" wrap="square" tIns="0">
+            <a:noAutofit/>
+          </a:bodyPr>
+          <a:lstStyle/>
+          <a:p>
+            <a:pPr indent="0" lvl="0" marL="0" marR="0" rtl="0" algn="ctr">
+              <a:lnSpc>
+                <a:spcPct val="100000"/>
+              </a:lnSpc>
+              <a:spcBef>
+                <a:spcPts val="320"/>
+              </a:spcBef>
+              <a:spcAft>
+                <a:spcPts val="0"/>
+              </a:spcAft>
+              <a:buClr>
+                <a:schemeClr val="dk1"/>
+              </a:buClr>
+              <a:buSzPts val="1100"/>
+              <a:buFont typeface="Arial"/>
+              <a:buNone/>
+            </a:pPr>
+            <a:r>
+              <a:t/>
+            </a:r>
+            <a:endParaRPr b="0" i="0" sz="1600" u="none" cap="none" strike="noStrike">
+              <a:solidFill>
+                <a:schemeClr val="dk1"/>
+              </a:solidFill>
+              <a:latin typeface="Arial"/>
+              <a:ea typeface="Arial"/>
+              <a:cs typeface="Arial"/>
+              <a:sym typeface="Arial"/>
+            </a:endParaRPr>
+          </a:p>
+          <a:p>
+            <a:pPr indent="0" lvl="0" marL="0" marR="0" rtl="0" algn="ctr">
+              <a:lnSpc>
+                <a:spcPct val="100000"/>
+              </a:lnSpc>
+              <a:spcBef>
+                <a:spcPts val="320"/>
+              </a:spcBef>
+              <a:spcAft>
+                <a:spcPts val="0"/>
+              </a:spcAft>
+              <a:buClr>
+                <a:schemeClr val="dk1"/>
+              </a:buClr>
+              <a:buSzPts val="1100"/>
+              <a:buFont typeface="Arial"/>
+              <a:buNone/>
+            </a:pPr>
+            <a:r>
+              <a:t/>
+            </a:r>
+            <a:endParaRPr b="0" i="0" sz="1600" u="none" cap="none" strike="noStrike">
+              <a:solidFill>
+                <a:schemeClr val="dk1"/>
+              </a:solidFill>
+              <a:latin typeface="Arial"/>
+              <a:ea typeface="Arial"/>
+              <a:cs typeface="Arial"/>
+              <a:sym typeface="Arial"/>
+            </a:endParaRPr>
+          </a:p>
+          <a:p>
+            <a:pPr indent="0" lvl="0" marL="0" marR="0" rtl="0" algn="ctr">
+              <a:lnSpc>
+                <a:spcPct val="100000"/>
+              </a:lnSpc>
+              <a:spcBef>
+                <a:spcPts val="320"/>
+              </a:spcBef>
+              <a:spcAft>
+                <a:spcPts val="0"/>
+              </a:spcAft>
+              <a:buClr>
+                <a:schemeClr val="dk1"/>
+              </a:buClr>
+              <a:buSzPts val="1100"/>
+              <a:buFont typeface="Arial"/>
+              <a:buNone/>
+            </a:pPr>
+            <a:r>
+              <a:t/>
+            </a:r>
+            <a:endParaRPr b="0" i="0" sz="1600" u="none" cap="none" strike="noStrike">
+              <a:solidFill>
+                <a:schemeClr val="dk1"/>
+              </a:solidFill>
+              <a:latin typeface="Arial"/>
+              <a:ea typeface="Arial"/>
+              <a:cs typeface="Arial"/>
+              <a:sym typeface="Arial"/>
+            </a:endParaRPr>
+          </a:p>
+          <a:p>
+            <a:pPr indent="0" lvl="0" marL="0" marR="0" rtl="0" algn="ctr">
+              <a:lnSpc>
+                <a:spcPct val="100000"/>
+              </a:lnSpc>
+              <a:spcBef>
+                <a:spcPts val="320"/>
+              </a:spcBef>
+              <a:spcAft>
+                <a:spcPts val="0"/>
+              </a:spcAft>
+              <a:buClr>
+                <a:schemeClr val="dk1"/>
+              </a:buClr>
+              <a:buSzPts val="1100"/>
+              <a:buFont typeface="Arial"/>
+              <a:buNone/>
+            </a:pPr>
+            <a:r>
+              <a:t/>
+            </a:r>
+            <a:endParaRPr b="0" i="0" sz="1600" u="none" cap="none" strike="noStrike">
+              <a:solidFill>
+                <a:schemeClr val="dk1"/>
+              </a:solidFill>
+              <a:latin typeface="Arial"/>
+              <a:ea typeface="Arial"/>
+              <a:cs typeface="Arial"/>
+              <a:sym typeface="Arial"/>
+            </a:endParaRPr>
+          </a:p>
+          <a:p>
+            <a:pPr indent="0" lvl="0" marL="0" marR="0" rtl="0" algn="ctr">
+              <a:lnSpc>
+                <a:spcPct val="100000"/>
+              </a:lnSpc>
+              <a:spcBef>
+                <a:spcPts val="320"/>
+              </a:spcBef>
+              <a:spcAft>
+                <a:spcPts val="0"/>
+              </a:spcAft>
+              <a:buClr>
+                <a:schemeClr val="dk1"/>
+              </a:buClr>
+              <a:buSzPts val="1100"/>
+              <a:buFont typeface="Arial"/>
+              <a:buNone/>
+            </a:pPr>
+            <a:r>
+              <a:t/>
+            </a:r>
+            <a:endParaRPr b="0" i="0" sz="1600" u="none" cap="none" strike="noStrike">
+              <a:solidFill>
+                <a:schemeClr val="dk1"/>
+              </a:solidFill>
+              <a:latin typeface="Arial"/>
+              <a:ea typeface="Arial"/>
+              <a:cs typeface="Arial"/>
+              <a:sym typeface="Arial"/>
+            </a:endParaRPr>
+          </a:p>
+          <a:p>
+            <a:pPr indent="0" lvl="0" marL="0" marR="0" rtl="0" algn="ctr">
+              <a:lnSpc>
+                <a:spcPct val="100000"/>
+              </a:lnSpc>
+              <a:spcBef>
+                <a:spcPts val="320"/>
+              </a:spcBef>
+              <a:spcAft>
+                <a:spcPts val="0"/>
+              </a:spcAft>
+              <a:buClr>
+                <a:schemeClr val="dk1"/>
+              </a:buClr>
+              <a:buSzPts val="1100"/>
+              <a:buFont typeface="Arial"/>
+              <a:buNone/>
+            </a:pPr>
+            <a:r>
+              <a:t/>
+            </a:r>
+            <a:endParaRPr b="0" i="0" sz="1600" u="none" cap="none" strike="noStrike">
+              <a:solidFill>
+                <a:schemeClr val="dk1"/>
+              </a:solidFill>
+              <a:latin typeface="Arial"/>
+              <a:ea typeface="Arial"/>
+              <a:cs typeface="Arial"/>
+              <a:sym typeface="Arial"/>
+            </a:endParaRPr>
+          </a:p>
+          <a:p>
+            <a:pPr indent="0" lvl="0" marL="0" marR="0" rtl="0" algn="ctr">
+              <a:lnSpc>
+                <a:spcPct val="100000"/>
+              </a:lnSpc>
+              <a:spcBef>
+                <a:spcPts val="320"/>
+              </a:spcBef>
+              <a:spcAft>
+                <a:spcPts val="0"/>
+              </a:spcAft>
+              <a:buClr>
+                <a:schemeClr val="dk1"/>
+              </a:buClr>
+              <a:buSzPts val="1100"/>
+              <a:buFont typeface="Arial"/>
+              <a:buNone/>
+            </a:pPr>
+            <a:r>
+              <a:rPr b="0" i="0" lang="de" sz="3600" u="none" cap="none" strike="noStrike">
+                <a:solidFill>
+                  <a:schemeClr val="dk1"/>
+                </a:solidFill>
+                <a:latin typeface="Arial"/>
+                <a:ea typeface="Arial"/>
+                <a:cs typeface="Arial"/>
+                <a:sym typeface="Arial"/>
+              </a:rPr>
+              <a:t>Fragen</a:t>
+            </a:r>
+            <a:endParaRPr b="0" i="0" sz="1600" u="none" cap="none" strike="noStrike">
+              <a:solidFill>
+                <a:schemeClr val="dk1"/>
+              </a:solidFill>
+              <a:latin typeface="Arial"/>
+              <a:ea typeface="Arial"/>
+              <a:cs typeface="Arial"/>
+              <a:sym typeface="Arial"/>
+            </a:endParaRPr>
+          </a:p>
+        </p:txBody>
+      </p:sp>
+    </p:spTree>
+  </p:cSld>
+  <p:clrMapOvr>
+    <a:masterClrMapping/>
+  </p:clrMapOvr>
+</p:sld>
+</file>
+
+<file path=ppt/slides/slide11.xml><?xml version="1.0" encoding="utf-8"?>
+<p:sld xmlns:a="http://schemas.openxmlformats.org/drawingml/2006/main" xmlns:r="http://schemas.openxmlformats.org/officeDocument/2006/relationships" xmlns:mc="http://schemas.openxmlformats.org/markup-compatibility/2006" xmlns:mv="urn:schemas-microsoft-com:mac:vml" xmlns:p="http://schemas.openxmlformats.org/presentationml/2006/main" xmlns:c="http://schemas.openxmlformats.org/drawingml/2006/chart" xmlns:dgm="http://schemas.openxmlformats.org/drawingml/2006/diagram" xmlns:o="urn:schemas-microsoft-com:office:office" xmlns:v="urn:schemas-microsoft-com:vml" xmlns:pvml="urn:schemas-microsoft-com:office:powerpoint" xmlns:com="http://schemas.openxmlformats.org/drawingml/2006/compatibility" xmlns:p14="http://schemas.microsoft.com/office/powerpoint/2010/main" xmlns:p15="http://schemas.microsoft.com/office/powerpoint/2012/main" xmlns:ahyp="http://schemas.microsoft.com/office/drawing/2018/hyperlinkcolor">
+  <p:cSld>
+    <p:spTree>
+      <p:nvGrpSpPr>
+        <p:cNvPr id="168" name="Shape 168"/>
+        <p:cNvGrpSpPr/>
+        <p:nvPr/>
+      </p:nvGrpSpPr>
+      <p:grpSpPr>
+        <a:xfrm>
+          <a:off x="0" y="0"/>
+          <a:ext cx="0" cy="0"/>
+          <a:chOff x="0" y="0"/>
+          <a:chExt cx="0" cy="0"/>
+        </a:xfrm>
+      </p:grpSpPr>
+      <p:sp>
+        <p:nvSpPr>
+          <p:cNvPr id="169" name="Google Shape;169;p26"/>
+          <p:cNvSpPr txBox="1"/>
+          <p:nvPr>
+            <p:ph type="title"/>
+          </p:nvPr>
+        </p:nvSpPr>
+        <p:spPr>
+          <a:xfrm>
+            <a:off x="431800" y="83344"/>
+            <a:ext cx="8375700" cy="531000"/>
+          </a:xfrm>
+          <a:prstGeom prst="rect">
+            <a:avLst/>
+          </a:prstGeom>
+          <a:noFill/>
+          <a:ln>
+            <a:noFill/>
+          </a:ln>
+        </p:spPr>
+        <p:txBody>
+          <a:bodyPr anchorCtr="0" anchor="b" bIns="0" lIns="0" spcFirstLastPara="1" rIns="0" wrap="square" tIns="0">
+            <a:noAutofit/>
+          </a:bodyPr>
+          <a:lstStyle/>
+          <a:p>
+            <a:pPr indent="0" lvl="0" marL="0" rtl="0" algn="l">
+              <a:lnSpc>
+                <a:spcPct val="100000"/>
+              </a:lnSpc>
+              <a:spcBef>
+                <a:spcPts val="0"/>
+              </a:spcBef>
+              <a:spcAft>
+                <a:spcPts val="0"/>
+              </a:spcAft>
+              <a:buSzPts val="1400"/>
+              <a:buNone/>
+            </a:pPr>
+            <a:r>
+              <a:rPr lang="de"/>
               <a:t>5. Übungsaufgabe</a:t>
             </a:r>
             <a:endParaRPr/>
@@ -9978,7 +10405,7 @@
       </p:sp>
       <p:sp>
         <p:nvSpPr>
-          <p:cNvPr id="161" name="Google Shape;161;p25"/>
+          <p:cNvPr id="170" name="Google Shape;170;p26"/>
           <p:cNvSpPr/>
           <p:nvPr>
             <p:ph idx="2" type="chart"/>
@@ -10230,8 +10657,35 @@
                 <a:cs typeface="Arial"/>
                 <a:sym typeface="Arial"/>
               </a:rPr>
-              <a:t>Das Programm soll erst enden, wenn der Nutzer als Namen-Parameter den String “quit” übergibt, ansonsten immer nach dem nächsten Namen fragen.</a:t>
+              <a:t>Das Programm soll erst enden, wenn der Nutzer als Namen-Parameter den String “quit” (oder v</a:t>
             </a:r>
+            <a:r>
+              <a:rPr lang="de" sz="1400"/>
+              <a:t>on mir aus auch “beenden”) </a:t>
+            </a:r>
+            <a:r>
+              <a:rPr b="0" i="0" lang="de" sz="1400" u="none" cap="none" strike="noStrike">
+                <a:solidFill>
+                  <a:schemeClr val="dk1"/>
+                </a:solidFill>
+                <a:latin typeface="Arial"/>
+                <a:ea typeface="Arial"/>
+                <a:cs typeface="Arial"/>
+                <a:sym typeface="Arial"/>
+              </a:rPr>
+              <a:t>übergibt, ansonsten immer nach dem nächsten Namen fragen.</a:t>
+            </a:r>
+            <a:br>
+              <a:rPr b="0" i="0" lang="de" sz="1400" u="none" cap="none" strike="noStrike">
+                <a:solidFill>
+                  <a:schemeClr val="dk1"/>
+                </a:solidFill>
+                <a:latin typeface="Arial"/>
+                <a:ea typeface="Arial"/>
+                <a:cs typeface="Arial"/>
+                <a:sym typeface="Arial"/>
+              </a:rPr>
+            </a:br>
             <a:endParaRPr sz="1400"/>
           </a:p>
           <a:p>
@@ -10255,11 +10709,25 @@
                 <a:cs typeface="Arial"/>
                 <a:sym typeface="Arial"/>
               </a:rPr>
-              <a:t>optional: Falls der übergebene Name sich nicht in dem Array befindet soll der Name zum Datensatz hinzugefügt werden (Vorsicht: Arrays haben eine fixe Länge, also musst du hier etwas überlegen. Frag uns gerne, wenn du hier nicht weiterkommst.)</a:t>
+              <a:t>optional: Falls der übergebene Name sich nicht in dem Array befindet soll der Name zum Datensatz hinzugefügt werden (Vorsicht: Arrays haben eine fixe Länge, also musst du hier etwas überlegen.)</a:t>
             </a:r>
-            <a:br>
+            <a:endParaRPr sz="1400"/>
+          </a:p>
+          <a:p>
+            <a:pPr indent="-317500" lvl="0" marL="457200" rtl="0" algn="l">
+              <a:spcBef>
+                <a:spcPts val="320"/>
+              </a:spcBef>
+              <a:spcAft>
+                <a:spcPts val="0"/>
+              </a:spcAft>
+              <a:buSzPts val="1400"/>
+              <a:buChar char="●"/>
+            </a:pPr>
+            <a:r>
               <a:rPr lang="de" sz="1400"/>
-            </a:br>
+              <a:t>optional: In jeder Iteration sollen alle aktuell gespeicherten Namen im Terminal ausgegeben werden</a:t>
+            </a:r>
             <a:endParaRPr sz="1400"/>
           </a:p>
           <a:p>
@@ -13225,7 +13693,23 @@
                 <a:cs typeface="Arial"/>
                 <a:sym typeface="Arial"/>
               </a:rPr>
-              <a:t> implementieren (mehr dazu später) kann man ohne Iterator-Variable iterieren. Jedoch kann man das Array, wenn es aus primitiven Datentypen besteht, nicht manipulieren (“Pass by Value”, auch dazu später mehr</a:t>
+              <a:t> implementieren (mehr dazu später) kann man ohne Iterator-Variable iterieren. Jedoch kann man das Array </a:t>
+            </a:r>
+            <a:r>
+              <a:rPr lang="de" sz="1600"/>
+              <a:t>mit foreach</a:t>
+            </a:r>
+            <a:r>
+              <a:rPr b="0" i="0" lang="de" sz="1600" u="none" cap="none" strike="noStrike">
+                <a:solidFill>
+                  <a:srgbClr val="000000"/>
+                </a:solidFill>
+                <a:latin typeface="Arial"/>
+                <a:ea typeface="Arial"/>
+                <a:cs typeface="Arial"/>
+                <a:sym typeface="Arial"/>
+              </a:rPr>
+              <a:t>, wenn es aus primitiven Datentypen besteht, nicht manipulieren (“Pass by Value”, auch dazu später mehr)</a:t>
             </a:r>
             <a:endParaRPr b="0" i="0" sz="1600" u="none" cap="none" strike="noStrike">
               <a:solidFill>
@@ -13339,7 +13823,7 @@
           </a:bodyPr>
           <a:lstStyle/>
           <a:p>
-            <a:pPr indent="-317500" lvl="0" marL="457200" marR="0" rtl="0" algn="l">
+            <a:pPr indent="-304800" lvl="0" marL="457200" marR="0" rtl="0" algn="l">
               <a:lnSpc>
                 <a:spcPct val="100000"/>
               </a:lnSpc>
@@ -13352,12 +13836,12 @@
               <a:buClr>
                 <a:srgbClr val="000000"/>
               </a:buClr>
-              <a:buSzPts val="1400"/>
+              <a:buSzPts val="1200"/>
               <a:buFont typeface="Arial"/>
               <a:buChar char="●"/>
             </a:pPr>
             <a:r>
-              <a:rPr b="1" i="0" lang="de" sz="1600" u="none" cap="none" strike="noStrike">
+              <a:rPr b="1" i="0" lang="de" sz="1400" u="none" cap="none" strike="noStrike">
                 <a:solidFill>
                   <a:schemeClr val="dk1"/>
                 </a:solidFill>
@@ -13368,7 +13852,7 @@
               </a:rPr>
               <a:t>break;</a:t>
             </a:r>
-            <a:endParaRPr b="0" i="0" sz="1600" u="none" cap="none" strike="noStrike">
+            <a:endParaRPr b="0" i="0" sz="1400" u="none" cap="none" strike="noStrike">
               <a:solidFill>
                 <a:schemeClr val="dk1"/>
               </a:solidFill>
@@ -13379,7 +13863,7 @@
             </a:endParaRPr>
           </a:p>
           <a:p>
-            <a:pPr indent="-330200" lvl="1" marL="914400" marR="0" rtl="0" algn="l">
+            <a:pPr indent="-317500" lvl="1" marL="914400" marR="0" rtl="0" algn="l">
               <a:lnSpc>
                 <a:spcPct val="100000"/>
               </a:lnSpc>
@@ -13392,12 +13876,12 @@
               <a:buClr>
                 <a:schemeClr val="dk1"/>
               </a:buClr>
-              <a:buSzPts val="1600"/>
+              <a:buSzPts val="1400"/>
               <a:buFont typeface="Noto Sans Symbols"/>
               <a:buChar char="-"/>
             </a:pPr>
             <a:r>
-              <a:rPr b="0" i="0" lang="de" sz="1600" u="none" cap="none" strike="noStrike">
+              <a:rPr b="0" i="0" lang="de" sz="1400" u="none" cap="none" strike="noStrike">
                 <a:solidFill>
                   <a:schemeClr val="dk1"/>
                 </a:solidFill>
@@ -13406,9 +13890,25 @@
                 <a:cs typeface="Arial"/>
                 <a:sym typeface="Arial"/>
               </a:rPr>
-              <a:t>Kann in Schleifen und switch-case-Statements verwendet werden</a:t>
+              <a:t>Kann in Schleifen und switch-case-Statements </a:t>
             </a:r>
-            <a:endParaRPr b="1" i="0" sz="1600" u="none" cap="none" strike="noStrike">
+            <a:r>
+              <a:rPr lang="de" sz="1400"/>
+              <a:t> </a:t>
+            </a:r>
+            <a:r>
+              <a:rPr b="0" i="0" lang="de" sz="1400" u="none" cap="none" strike="noStrike">
+                <a:solidFill>
+                  <a:schemeClr val="dk1"/>
+                </a:solidFill>
+                <a:latin typeface="Arial"/>
+                <a:ea typeface="Arial"/>
+                <a:cs typeface="Arial"/>
+                <a:sym typeface="Arial"/>
+              </a:rPr>
+              <a:t>verwendet werden</a:t>
+            </a:r>
+            <a:endParaRPr b="1" i="0" sz="1400" u="none" cap="none" strike="noStrike">
               <a:solidFill>
                 <a:schemeClr val="dk1"/>
               </a:solidFill>
@@ -13419,7 +13919,7 @@
             </a:endParaRPr>
           </a:p>
           <a:p>
-            <a:pPr indent="-330200" lvl="1" marL="914400" marR="0" rtl="0" algn="l">
+            <a:pPr indent="-317500" lvl="1" marL="914400" marR="0" rtl="0" algn="l">
               <a:lnSpc>
                 <a:spcPct val="100000"/>
               </a:lnSpc>
@@ -13432,12 +13932,12 @@
               <a:buClr>
                 <a:schemeClr val="dk1"/>
               </a:buClr>
-              <a:buSzPts val="1600"/>
+              <a:buSzPts val="1400"/>
               <a:buFont typeface="Noto Sans Symbols"/>
               <a:buChar char="-"/>
             </a:pPr>
             <a:r>
-              <a:rPr b="0" i="0" lang="de" sz="1600" u="none" cap="none" strike="noStrike">
+              <a:rPr b="0" i="0" lang="de" sz="1400" u="none" cap="none" strike="noStrike">
                 <a:solidFill>
                   <a:schemeClr val="dk1"/>
                 </a:solidFill>
@@ -13446,9 +13946,25 @@
                 <a:cs typeface="Arial"/>
                 <a:sym typeface="Arial"/>
               </a:rPr>
-              <a:t>Kontrollstruktur wird an der Stelle beendet. Es wird bei dem Programmcode nach der Kontrollstruktur weiter gelesen</a:t>
+              <a:t>Kontrollstruktur wird an der Stelle beendet. Es wird bei dem Programmcode nach der</a:t>
             </a:r>
-            <a:endParaRPr b="0" i="0" sz="1600" u="none" cap="none" strike="noStrike">
+            <a:r>
+              <a:rPr lang="de" sz="1400"/>
+              <a:t> </a:t>
+            </a:r>
+            <a:r>
+              <a:rPr b="0" i="0" lang="de" sz="1400" u="none" cap="none" strike="noStrike">
+                <a:solidFill>
+                  <a:schemeClr val="dk1"/>
+                </a:solidFill>
+                <a:latin typeface="Arial"/>
+                <a:ea typeface="Arial"/>
+                <a:cs typeface="Arial"/>
+                <a:sym typeface="Arial"/>
+              </a:rPr>
+              <a:t>Kontrollstruktur weiter gelesen</a:t>
+            </a:r>
+            <a:endParaRPr b="0" i="0" sz="1400" u="none" cap="none" strike="noStrike">
               <a:solidFill>
                 <a:schemeClr val="dk1"/>
               </a:solidFill>
@@ -13459,7 +13975,7 @@
             </a:endParaRPr>
           </a:p>
           <a:p>
-            <a:pPr indent="-330200" lvl="1" marL="914400" marR="0" rtl="0" algn="l">
+            <a:pPr indent="-317500" lvl="1" marL="914400" marR="0" rtl="0" algn="l">
               <a:lnSpc>
                 <a:spcPct val="100000"/>
               </a:lnSpc>
@@ -13472,12 +13988,12 @@
               <a:buClr>
                 <a:schemeClr val="dk1"/>
               </a:buClr>
-              <a:buSzPts val="1600"/>
+              <a:buSzPts val="1400"/>
               <a:buFont typeface="Noto Sans Symbols"/>
               <a:buChar char="-"/>
             </a:pPr>
             <a:r>
-              <a:rPr b="0" i="0" lang="de" sz="1600" u="none" cap="none" strike="noStrike">
+              <a:rPr b="0" i="0" lang="de" sz="1400" u="none" cap="none" strike="noStrike">
                 <a:solidFill>
                   <a:schemeClr val="dk1"/>
                 </a:solidFill>
@@ -13486,10 +14002,14 @@
                 <a:cs typeface="Arial"/>
                 <a:sym typeface="Arial"/>
               </a:rPr>
-              <a:t>mit dem break-Statement springt man immer nur aus der innersten Schleife raus.</a:t>
+              <a:t>mit dem break-Statement springt man immer </a:t>
             </a:r>
-            <a:br>
-              <a:rPr b="0" i="0" lang="de" sz="1600" u="none" cap="none" strike="noStrike">
+            <a:r>
+              <a:rPr lang="de" sz="1400"/>
+              <a:t> </a:t>
+            </a:r>
+            <a:r>
+              <a:rPr b="0" i="0" lang="de" sz="1400" u="none" cap="none" strike="noStrike">
                 <a:solidFill>
                   <a:schemeClr val="dk1"/>
                 </a:solidFill>
@@ -13498,179 +14018,9 @@
                 <a:cs typeface="Arial"/>
                 <a:sym typeface="Arial"/>
               </a:rPr>
-            </a:br>
-            <a:br>
-              <a:rPr b="0" i="0" lang="de" sz="1600" u="none" cap="none" strike="noStrike">
-                <a:solidFill>
-                  <a:schemeClr val="dk1"/>
-                </a:solidFill>
-                <a:latin typeface="Arial"/>
-                <a:ea typeface="Arial"/>
-                <a:cs typeface="Arial"/>
-                <a:sym typeface="Arial"/>
-              </a:rPr>
-            </a:br>
-            <a:endParaRPr b="0" i="0" sz="1600" u="none" cap="none" strike="noStrike">
-              <a:solidFill>
-                <a:schemeClr val="dk1"/>
-              </a:solidFill>
-              <a:latin typeface="Arial"/>
-              <a:ea typeface="Arial"/>
-              <a:cs typeface="Arial"/>
-              <a:sym typeface="Arial"/>
-            </a:endParaRPr>
-          </a:p>
-          <a:p>
-            <a:pPr indent="-317500" lvl="0" marL="457200" marR="0" rtl="0" algn="l">
-              <a:lnSpc>
-                <a:spcPct val="100000"/>
-              </a:lnSpc>
-              <a:spcBef>
-                <a:spcPts val="0"/>
-              </a:spcBef>
-              <a:spcAft>
-                <a:spcPts val="0"/>
-              </a:spcAft>
-              <a:buClr>
-                <a:srgbClr val="000000"/>
-              </a:buClr>
-              <a:buSzPts val="1400"/>
-              <a:buFont typeface="Arial"/>
-              <a:buChar char="●"/>
-            </a:pPr>
-            <a:r>
-              <a:rPr b="1" i="0" lang="de" sz="1600" u="none" cap="none" strike="noStrike">
-                <a:solidFill>
-                  <a:schemeClr val="dk1"/>
-                </a:solidFill>
-                <a:latin typeface="Arial"/>
-                <a:ea typeface="Arial"/>
-                <a:cs typeface="Arial"/>
-                <a:sym typeface="Arial"/>
-              </a:rPr>
-              <a:t>continue;</a:t>
+              <a:t>nur aus der innersten Schleife raus.</a:t>
             </a:r>
-            <a:endParaRPr b="0" i="0" sz="1600" u="none" cap="none" strike="noStrike">
-              <a:solidFill>
-                <a:schemeClr val="dk1"/>
-              </a:solidFill>
-              <a:latin typeface="Arial"/>
-              <a:ea typeface="Arial"/>
-              <a:cs typeface="Arial"/>
-              <a:sym typeface="Arial"/>
-            </a:endParaRPr>
-          </a:p>
-          <a:p>
-            <a:pPr indent="-330200" lvl="1" marL="914400" marR="0" rtl="0" algn="l">
-              <a:lnSpc>
-                <a:spcPct val="100000"/>
-              </a:lnSpc>
-              <a:spcBef>
-                <a:spcPts val="0"/>
-              </a:spcBef>
-              <a:spcAft>
-                <a:spcPts val="0"/>
-              </a:spcAft>
-              <a:buClr>
-                <a:schemeClr val="dk1"/>
-              </a:buClr>
-              <a:buSzPts val="1600"/>
-              <a:buFont typeface="Noto Sans Symbols"/>
-              <a:buChar char="-"/>
-            </a:pPr>
-            <a:r>
-              <a:rPr b="0" i="0" lang="de" sz="1600" u="none" cap="none" strike="noStrike">
-                <a:solidFill>
-                  <a:schemeClr val="dk1"/>
-                </a:solidFill>
-                <a:latin typeface="Arial"/>
-                <a:ea typeface="Arial"/>
-                <a:cs typeface="Arial"/>
-                <a:sym typeface="Arial"/>
-              </a:rPr>
-              <a:t>Kann nur in Schleifen verwendet werden</a:t>
-            </a:r>
-            <a:endParaRPr b="0" i="0" sz="1600" u="none" cap="none" strike="noStrike">
-              <a:solidFill>
-                <a:schemeClr val="dk1"/>
-              </a:solidFill>
-              <a:latin typeface="Arial"/>
-              <a:ea typeface="Arial"/>
-              <a:cs typeface="Arial"/>
-              <a:sym typeface="Arial"/>
-            </a:endParaRPr>
-          </a:p>
-          <a:p>
-            <a:pPr indent="-330200" lvl="1" marL="914400" marR="0" rtl="0" algn="l">
-              <a:lnSpc>
-                <a:spcPct val="100000"/>
-              </a:lnSpc>
-              <a:spcBef>
-                <a:spcPts val="0"/>
-              </a:spcBef>
-              <a:spcAft>
-                <a:spcPts val="0"/>
-              </a:spcAft>
-              <a:buClr>
-                <a:schemeClr val="dk1"/>
-              </a:buClr>
-              <a:buSzPts val="1600"/>
-              <a:buFont typeface="Noto Sans Symbols"/>
-              <a:buChar char="-"/>
-            </a:pPr>
-            <a:r>
-              <a:rPr b="0" i="0" lang="de" sz="1600" u="none" cap="none" strike="noStrike">
-                <a:solidFill>
-                  <a:schemeClr val="dk1"/>
-                </a:solidFill>
-                <a:latin typeface="Arial"/>
-                <a:ea typeface="Arial"/>
-                <a:cs typeface="Arial"/>
-                <a:sym typeface="Arial"/>
-              </a:rPr>
-              <a:t>Es wird direkt mit der nächsten Iteration der Schleife begonnen, ohne den weiteren Programmcode der aktuellen Iteration auszuführen.</a:t>
-            </a:r>
-            <a:endParaRPr b="0" i="0" sz="1600" u="none" cap="none" strike="noStrike">
-              <a:solidFill>
-                <a:schemeClr val="dk1"/>
-              </a:solidFill>
-              <a:latin typeface="Arial"/>
-              <a:ea typeface="Arial"/>
-              <a:cs typeface="Arial"/>
-              <a:sym typeface="Arial"/>
-            </a:endParaRPr>
-          </a:p>
-          <a:p>
-            <a:pPr indent="-330200" lvl="1" marL="914400" marR="0" rtl="0" algn="l">
-              <a:lnSpc>
-                <a:spcPct val="100000"/>
-              </a:lnSpc>
-              <a:spcBef>
-                <a:spcPts val="0"/>
-              </a:spcBef>
-              <a:spcAft>
-                <a:spcPts val="0"/>
-              </a:spcAft>
-              <a:buClr>
-                <a:schemeClr val="dk1"/>
-              </a:buClr>
-              <a:buSzPts val="1600"/>
-              <a:buFont typeface="Noto Sans Symbols"/>
-              <a:buChar char="-"/>
-            </a:pPr>
-            <a:r>
-              <a:rPr b="0" i="0" lang="de" sz="1600" u="none" cap="none" strike="noStrike">
-                <a:solidFill>
-                  <a:schemeClr val="dk1"/>
-                </a:solidFill>
-                <a:latin typeface="Arial"/>
-                <a:ea typeface="Arial"/>
-                <a:cs typeface="Arial"/>
-                <a:sym typeface="Arial"/>
-              </a:rPr>
-              <a:t>mit dem continue-Statement springt man in die nächste Iteration der innersten Schleife</a:t>
-            </a:r>
-            <a:endParaRPr b="0" i="0" sz="1600" u="none" cap="none" strike="noStrike">
+            <a:endParaRPr b="0" i="0" sz="1400" u="none" cap="none" strike="noStrike">
               <a:solidFill>
                 <a:schemeClr val="dk1"/>
               </a:solidFill>
@@ -13682,6 +14032,34 @@
           </a:p>
         </p:txBody>
       </p:sp>
+      <p:pic>
+        <p:nvPicPr>
+          <p:cNvPr id="150" name="Google Shape;150;p23"/>
+          <p:cNvPicPr preferRelativeResize="0"/>
+          <p:nvPr/>
+        </p:nvPicPr>
+        <p:blipFill>
+          <a:blip r:embed="rId3">
+            <a:alphaModFix/>
+          </a:blip>
+          <a:stretch>
+            <a:fillRect/>
+          </a:stretch>
+        </p:blipFill>
+        <p:spPr>
+          <a:xfrm>
+            <a:off x="3141925" y="2237075"/>
+            <a:ext cx="2860150" cy="1816300"/>
+          </a:xfrm>
+          <a:prstGeom prst="rect">
+            <a:avLst/>
+          </a:prstGeom>
+          <a:noFill/>
+          <a:ln>
+            <a:noFill/>
+          </a:ln>
+        </p:spPr>
+      </p:pic>
     </p:spTree>
   </p:cSld>
   <p:clrMapOvr>
@@ -13695,7 +14073,7 @@
   <p:cSld>
     <p:spTree>
       <p:nvGrpSpPr>
-        <p:cNvPr id="153" name="Shape 153"/>
+        <p:cNvPr id="154" name="Shape 154"/>
         <p:cNvGrpSpPr/>
         <p:nvPr/>
       </p:nvGrpSpPr>
@@ -13709,7 +14087,7 @@
       </p:grpSpPr>
       <p:sp>
         <p:nvSpPr>
-          <p:cNvPr id="154" name="Google Shape;154;p24"/>
+          <p:cNvPr id="155" name="Google Shape;155;p24"/>
           <p:cNvSpPr txBox="1"/>
           <p:nvPr>
             <p:ph type="title"/>
@@ -13723,10 +14101,6 @@
           <a:prstGeom prst="rect">
             <a:avLst/>
           </a:prstGeom>
-          <a:noFill/>
-          <a:ln>
-            <a:noFill/>
-          </a:ln>
         </p:spPr>
         <p:txBody>
           <a:bodyPr anchorCtr="0" anchor="b" bIns="0" lIns="0" spcFirstLastPara="1" rIns="0" wrap="square" tIns="0">
@@ -13735,21 +14109,17 @@
           <a:lstStyle/>
           <a:p>
             <a:pPr indent="0" lvl="0" marL="0" rtl="0" algn="l">
-              <a:lnSpc>
-                <a:spcPct val="100000"/>
-              </a:lnSpc>
-              <a:spcBef>
-                <a:spcPts val="0"/>
-              </a:spcBef>
-              <a:spcAft>
-                <a:spcPts val="0"/>
-              </a:spcAft>
-              <a:buSzPts val="1400"/>
+              <a:spcBef>
+                <a:spcPts val="0"/>
+              </a:spcBef>
+              <a:spcAft>
+                <a:spcPts val="0"/>
+              </a:spcAft>
               <a:buNone/>
             </a:pPr>
             <a:r>
               <a:rPr lang="de"/>
-              <a:t>4. Fragen</a:t>
+              <a:t>2.3. break &amp; continue</a:t>
             </a:r>
             <a:endParaRPr/>
           </a:p>
@@ -13757,7 +14127,7 @@
       </p:sp>
       <p:sp>
         <p:nvSpPr>
-          <p:cNvPr id="155" name="Google Shape;155;p24"/>
+          <p:cNvPr id="156" name="Google Shape;156;p24"/>
           <p:cNvSpPr/>
           <p:nvPr>
             <p:ph idx="2" type="chart"/>
@@ -13771,10 +14141,6 @@
           <a:prstGeom prst="rect">
             <a:avLst/>
           </a:prstGeom>
-          <a:noFill/>
-          <a:ln>
-            <a:noFill/>
-          </a:ln>
         </p:spPr>
         <p:txBody>
           <a:bodyPr anchorCtr="0" anchor="t" bIns="0" lIns="0" spcFirstLastPara="1" rIns="0" wrap="square" tIns="0">
@@ -13782,12 +14148,9 @@
           </a:bodyPr>
           <a:lstStyle/>
           <a:p>
-            <a:pPr indent="0" lvl="0" marL="0" marR="0" rtl="0" algn="ctr">
-              <a:lnSpc>
-                <a:spcPct val="100000"/>
-              </a:lnSpc>
-              <a:spcBef>
-                <a:spcPts val="320"/>
+            <a:pPr indent="-304800" lvl="0" marL="457200" rtl="0" algn="l">
+              <a:spcBef>
+                <a:spcPts val="0"/>
               </a:spcBef>
               <a:spcAft>
                 <a:spcPts val="0"/>
@@ -13795,220 +14158,124 @@
               <a:buClr>
                 <a:schemeClr val="dk1"/>
               </a:buClr>
-              <a:buSzPts val="1100"/>
-              <a:buFont typeface="Arial"/>
-              <a:buNone/>
+              <a:buSzPts val="1200"/>
+              <a:buChar char="●"/>
             </a:pPr>
             <a:r>
-              <a:t/>
+              <a:rPr b="1" lang="de" sz="1400"/>
+              <a:t>continue;</a:t>
             </a:r>
-            <a:endParaRPr b="0" i="0" sz="1600" u="none" cap="none" strike="noStrike">
-              <a:solidFill>
-                <a:schemeClr val="dk1"/>
-              </a:solidFill>
-              <a:latin typeface="Arial"/>
-              <a:ea typeface="Arial"/>
-              <a:cs typeface="Arial"/>
-              <a:sym typeface="Arial"/>
-            </a:endParaRPr>
+            <a:endParaRPr sz="1400"/>
           </a:p>
           <a:p>
-            <a:pPr indent="0" lvl="0" marL="0" marR="0" rtl="0" algn="ctr">
-              <a:lnSpc>
-                <a:spcPct val="100000"/>
-              </a:lnSpc>
-              <a:spcBef>
-                <a:spcPts val="320"/>
-              </a:spcBef>
-              <a:spcAft>
-                <a:spcPts val="0"/>
-              </a:spcAft>
-              <a:buClr>
-                <a:schemeClr val="dk1"/>
-              </a:buClr>
-              <a:buSzPts val="1100"/>
-              <a:buFont typeface="Arial"/>
-              <a:buNone/>
+            <a:pPr indent="-317500" lvl="1" marL="914400" rtl="0" algn="l">
+              <a:spcBef>
+                <a:spcPts val="0"/>
+              </a:spcBef>
+              <a:spcAft>
+                <a:spcPts val="0"/>
+              </a:spcAft>
+              <a:buSzPts val="1400"/>
+              <a:buChar char="-"/>
             </a:pPr>
             <a:r>
-              <a:t/>
+              <a:rPr lang="de" sz="1400"/>
+              <a:t>Kann nur in Schleifen verwendet werden</a:t>
             </a:r>
-            <a:endParaRPr b="0" i="0" sz="1600" u="none" cap="none" strike="noStrike">
-              <a:solidFill>
-                <a:schemeClr val="dk1"/>
-              </a:solidFill>
-              <a:latin typeface="Arial"/>
-              <a:ea typeface="Arial"/>
-              <a:cs typeface="Arial"/>
-              <a:sym typeface="Arial"/>
-            </a:endParaRPr>
+            <a:endParaRPr sz="1400"/>
           </a:p>
           <a:p>
-            <a:pPr indent="0" lvl="0" marL="0" marR="0" rtl="0" algn="ctr">
-              <a:lnSpc>
-                <a:spcPct val="100000"/>
-              </a:lnSpc>
-              <a:spcBef>
-                <a:spcPts val="320"/>
-              </a:spcBef>
-              <a:spcAft>
-                <a:spcPts val="0"/>
-              </a:spcAft>
-              <a:buClr>
-                <a:schemeClr val="dk1"/>
-              </a:buClr>
-              <a:buSzPts val="1100"/>
-              <a:buFont typeface="Arial"/>
-              <a:buNone/>
+            <a:pPr indent="-317500" lvl="1" marL="914400" rtl="0" algn="l">
+              <a:spcBef>
+                <a:spcPts val="0"/>
+              </a:spcBef>
+              <a:spcAft>
+                <a:spcPts val="0"/>
+              </a:spcAft>
+              <a:buSzPts val="1400"/>
+              <a:buChar char="-"/>
             </a:pPr>
             <a:r>
-              <a:t/>
+              <a:rPr lang="de" sz="1400"/>
+              <a:t>Es wird direkt mit der nächsten Iteration der Schleife begonnen, ohne den weiteren Programmcode der aktuellen Iteration auszuführen.</a:t>
             </a:r>
-            <a:endParaRPr b="0" i="0" sz="1600" u="none" cap="none" strike="noStrike">
-              <a:solidFill>
-                <a:schemeClr val="dk1"/>
-              </a:solidFill>
-              <a:latin typeface="Arial"/>
-              <a:ea typeface="Arial"/>
-              <a:cs typeface="Arial"/>
-              <a:sym typeface="Arial"/>
-            </a:endParaRPr>
+            <a:endParaRPr sz="1400"/>
           </a:p>
           <a:p>
-            <a:pPr indent="0" lvl="0" marL="0" marR="0" rtl="0" algn="ctr">
-              <a:lnSpc>
-                <a:spcPct val="100000"/>
-              </a:lnSpc>
-              <a:spcBef>
-                <a:spcPts val="320"/>
-              </a:spcBef>
-              <a:spcAft>
-                <a:spcPts val="0"/>
-              </a:spcAft>
-              <a:buClr>
-                <a:schemeClr val="dk1"/>
-              </a:buClr>
-              <a:buSzPts val="1100"/>
-              <a:buFont typeface="Arial"/>
-              <a:buNone/>
+            <a:pPr indent="-317500" lvl="1" marL="914400" rtl="0" algn="l">
+              <a:spcBef>
+                <a:spcPts val="0"/>
+              </a:spcBef>
+              <a:spcAft>
+                <a:spcPts val="0"/>
+              </a:spcAft>
+              <a:buSzPts val="1400"/>
+              <a:buChar char="-"/>
             </a:pPr>
             <a:r>
-              <a:t/>
+              <a:rPr lang="de" sz="1400"/>
+              <a:t>mit dem continue-Statement springt man in die  nächste Iteration der innersten Schleife</a:t>
             </a:r>
-            <a:endParaRPr b="0" i="0" sz="1600" u="none" cap="none" strike="noStrike">
-              <a:solidFill>
-                <a:schemeClr val="dk1"/>
-              </a:solidFill>
-              <a:latin typeface="Arial"/>
-              <a:ea typeface="Arial"/>
-              <a:cs typeface="Arial"/>
-              <a:sym typeface="Arial"/>
-            </a:endParaRPr>
-          </a:p>
-          <a:p>
-            <a:pPr indent="0" lvl="0" marL="0" marR="0" rtl="0" algn="ctr">
-              <a:lnSpc>
-                <a:spcPct val="100000"/>
-              </a:lnSpc>
-              <a:spcBef>
-                <a:spcPts val="320"/>
-              </a:spcBef>
-              <a:spcAft>
-                <a:spcPts val="0"/>
-              </a:spcAft>
-              <a:buClr>
-                <a:schemeClr val="dk1"/>
-              </a:buClr>
-              <a:buSzPts val="1100"/>
-              <a:buFont typeface="Arial"/>
-              <a:buNone/>
-            </a:pPr>
-            <a:r>
-              <a:t/>
-            </a:r>
-            <a:endParaRPr b="0" i="0" sz="1600" u="none" cap="none" strike="noStrike">
-              <a:solidFill>
-                <a:schemeClr val="dk1"/>
-              </a:solidFill>
-              <a:latin typeface="Arial"/>
-              <a:ea typeface="Arial"/>
-              <a:cs typeface="Arial"/>
-              <a:sym typeface="Arial"/>
-            </a:endParaRPr>
-          </a:p>
-          <a:p>
-            <a:pPr indent="0" lvl="0" marL="0" marR="0" rtl="0" algn="ctr">
-              <a:lnSpc>
-                <a:spcPct val="100000"/>
-              </a:lnSpc>
-              <a:spcBef>
-                <a:spcPts val="320"/>
-              </a:spcBef>
-              <a:spcAft>
-                <a:spcPts val="0"/>
-              </a:spcAft>
-              <a:buClr>
-                <a:schemeClr val="dk1"/>
-              </a:buClr>
-              <a:buSzPts val="1100"/>
-              <a:buFont typeface="Arial"/>
-              <a:buNone/>
-            </a:pPr>
-            <a:r>
-              <a:t/>
-            </a:r>
-            <a:endParaRPr b="0" i="0" sz="1600" u="none" cap="none" strike="noStrike">
-              <a:solidFill>
-                <a:schemeClr val="dk1"/>
-              </a:solidFill>
-              <a:latin typeface="Arial"/>
-              <a:ea typeface="Arial"/>
-              <a:cs typeface="Arial"/>
-              <a:sym typeface="Arial"/>
-            </a:endParaRPr>
-          </a:p>
-          <a:p>
-            <a:pPr indent="0" lvl="0" marL="0" marR="0" rtl="0" algn="ctr">
-              <a:lnSpc>
-                <a:spcPct val="100000"/>
-              </a:lnSpc>
-              <a:spcBef>
-                <a:spcPts val="320"/>
-              </a:spcBef>
-              <a:spcAft>
-                <a:spcPts val="0"/>
-              </a:spcAft>
-              <a:buClr>
-                <a:schemeClr val="dk1"/>
-              </a:buClr>
-              <a:buSzPts val="1100"/>
-              <a:buFont typeface="Arial"/>
-              <a:buNone/>
-            </a:pPr>
-            <a:r>
-              <a:rPr b="0" i="0" lang="de" sz="3600" u="none" cap="none" strike="noStrike">
-                <a:solidFill>
-                  <a:schemeClr val="dk1"/>
-                </a:solidFill>
-                <a:latin typeface="Arial"/>
-                <a:ea typeface="Arial"/>
-                <a:cs typeface="Arial"/>
-                <a:sym typeface="Arial"/>
-              </a:rPr>
-              <a:t>Fragen</a:t>
-            </a:r>
-            <a:endParaRPr b="0" i="0" sz="1600" u="none" cap="none" strike="noStrike">
-              <a:solidFill>
-                <a:schemeClr val="dk1"/>
-              </a:solidFill>
-              <a:latin typeface="Arial"/>
-              <a:ea typeface="Arial"/>
-              <a:cs typeface="Arial"/>
-              <a:sym typeface="Arial"/>
-            </a:endParaRPr>
+            <a:endParaRPr/>
           </a:p>
         </p:txBody>
       </p:sp>
+      <p:pic>
+        <p:nvPicPr>
+          <p:cNvPr id="157" name="Google Shape;157;p24"/>
+          <p:cNvPicPr preferRelativeResize="0"/>
+          <p:nvPr/>
+        </p:nvPicPr>
+        <p:blipFill>
+          <a:blip r:embed="rId3">
+            <a:alphaModFix/>
+          </a:blip>
+          <a:stretch>
+            <a:fillRect/>
+          </a:stretch>
+        </p:blipFill>
+        <p:spPr>
+          <a:xfrm>
+            <a:off x="1654150" y="2382100"/>
+            <a:ext cx="2645950" cy="1617500"/>
+          </a:xfrm>
+          <a:prstGeom prst="rect">
+            <a:avLst/>
+          </a:prstGeom>
+          <a:noFill/>
+          <a:ln>
+            <a:noFill/>
+          </a:ln>
+        </p:spPr>
+      </p:pic>
+      <p:pic>
+        <p:nvPicPr>
+          <p:cNvPr id="158" name="Google Shape;158;p24"/>
+          <p:cNvPicPr preferRelativeResize="0"/>
+          <p:nvPr/>
+        </p:nvPicPr>
+        <p:blipFill>
+          <a:blip r:embed="rId4">
+            <a:alphaModFix/>
+          </a:blip>
+          <a:stretch>
+            <a:fillRect/>
+          </a:stretch>
+        </p:blipFill>
+        <p:spPr>
+          <a:xfrm>
+            <a:off x="5460450" y="2382100"/>
+            <a:ext cx="2627271" cy="1617500"/>
+          </a:xfrm>
+          <a:prstGeom prst="rect">
+            <a:avLst/>
+          </a:prstGeom>
+          <a:noFill/>
+          <a:ln>
+            <a:noFill/>
+          </a:ln>
+        </p:spPr>
+      </p:pic>
     </p:spTree>
   </p:cSld>
   <p:clrMapOvr>
@@ -14018,6 +14285,285 @@
 </file>
 
 <file path=ppt/theme/theme1.xml><?xml version="1.0" encoding="utf-8"?>
+<a:theme xmlns:a="http://schemas.openxmlformats.org/drawingml/2006/main" xmlns:r="http://schemas.openxmlformats.org/officeDocument/2006/relationships">
+  <a:themeElements>
+    <a:clrScheme name="Default">
+      <a:dk1>
+        <a:srgbClr val="000000"/>
+      </a:dk1>
+      <a:lt1>
+        <a:srgbClr val="FFFFFF"/>
+      </a:lt1>
+      <a:dk2>
+        <a:srgbClr val="158158"/>
+      </a:dk2>
+      <a:lt2>
+        <a:srgbClr val="F3F3F3"/>
+      </a:lt2>
+      <a:accent1>
+        <a:srgbClr val="058DC7"/>
+      </a:accent1>
+      <a:accent2>
+        <a:srgbClr val="50B432"/>
+      </a:accent2>
+      <a:accent3>
+        <a:srgbClr val="ED561B"/>
+      </a:accent3>
+      <a:accent4>
+        <a:srgbClr val="EDEF00"/>
+      </a:accent4>
+      <a:accent5>
+        <a:srgbClr val="24CBE5"/>
+      </a:accent5>
+      <a:accent6>
+        <a:srgbClr val="64E572"/>
+      </a:accent6>
+      <a:hlink>
+        <a:srgbClr val="2200CC"/>
+      </a:hlink>
+      <a:folHlink>
+        <a:srgbClr val="551A8B"/>
+      </a:folHlink>
+    </a:clrScheme>
+    <a:fontScheme name="Office">
+      <a:majorFont>
+        <a:latin typeface="Arial"/>
+        <a:ea typeface=""/>
+        <a:cs typeface=""/>
+        <a:font script="Jpan" typeface="ＭＳ Ｐゴシック"/>
+        <a:font script="Hang" typeface="맑은 고딕"/>
+        <a:font script="Hans" typeface="宋体"/>
+        <a:font script="Hant" typeface="新細明體"/>
+        <a:font script="Arab" typeface="Times New Roman"/>
+        <a:font script="Hebr" typeface="Times New Roman"/>
+        <a:font script="Thai" typeface="Angsana New"/>
+        <a:font script="Ethi" typeface="Nyala"/>
+        <a:font script="Beng" typeface="Vrinda"/>
+        <a:font script="Gujr" typeface="Shruti"/>
+        <a:font script="Khmr" typeface="MoolBoran"/>
+        <a:font script="Knda" typeface="Tunga"/>
+        <a:font script="Guru" typeface="Raavi"/>
+        <a:font script="Cans" typeface="Euphemia"/>
+        <a:font script="Cher" typeface="Plantagenet Cherokee"/>
+        <a:font script="Yiii" typeface="Microsoft Yi Baiti"/>
+        <a:font script="Tibt" typeface="Microsoft Himalaya"/>
+        <a:font script="Thaa" typeface="MV Boli"/>
+        <a:font script="Deva" typeface="Mangal"/>
+        <a:font script="Telu" typeface="Gautami"/>
+        <a:font script="Taml" typeface="Latha"/>
+        <a:font script="Syrc" typeface="Estrangelo Edessa"/>
+        <a:font script="Orya" typeface="Kalinga"/>
+        <a:font script="Mlym" typeface="Kartika"/>
+        <a:font script="Laoo" typeface="DokChampa"/>
+        <a:font script="Sinh" typeface="Iskoola Pota"/>
+        <a:font script="Mong" typeface="Mongolian Baiti"/>
+        <a:font script="Viet" typeface="Times New Roman"/>
+        <a:font script="Uigh" typeface="Microsoft Uighur"/>
+        <a:font script="Geor" typeface="Sylfaen"/>
+      </a:majorFont>
+      <a:minorFont>
+        <a:latin typeface="Arial"/>
+        <a:ea typeface=""/>
+        <a:cs typeface=""/>
+        <a:font script="Jpan" typeface="ＭＳ Ｐゴシック"/>
+        <a:font script="Hang" typeface="맑은 고딕"/>
+        <a:font script="Hans" typeface="宋体"/>
+        <a:font script="Hant" typeface="新細明體"/>
+        <a:font script="Arab" typeface="Arial"/>
+        <a:font script="Hebr" typeface="Arial"/>
+        <a:font script="Thai" typeface="Cordia New"/>
+        <a:font script="Ethi" typeface="Nyala"/>
+        <a:font script="Beng" typeface="Vrinda"/>
+        <a:font script="Gujr" typeface="Shruti"/>
+        <a:font script="Khmr" typeface="DaunPenh"/>
+        <a:font script="Knda" typeface="Tunga"/>
+        <a:font script="Guru" typeface="Raavi"/>
+        <a:font script="Cans" typeface="Euphemia"/>
+        <a:font script="Cher" typeface="Plantagenet Cherokee"/>
+        <a:font script="Yiii" typeface="Microsoft Yi Baiti"/>
+        <a:font script="Tibt" typeface="Microsoft Himalaya"/>
+        <a:font script="Thaa" typeface="MV Boli"/>
+        <a:font script="Deva" typeface="Mangal"/>
+        <a:font script="Telu" typeface="Gautami"/>
+        <a:font script="Taml" typeface="Latha"/>
+        <a:font script="Syrc" typeface="Estrangelo Edessa"/>
+        <a:font script="Orya" typeface="Kalinga"/>
+        <a:font script="Mlym" typeface="Kartika"/>
+        <a:font script="Laoo" typeface="DokChampa"/>
+        <a:font script="Sinh" typeface="Iskoola Pota"/>
+        <a:font script="Mong" typeface="Mongolian Baiti"/>
+        <a:font script="Viet" typeface="Arial"/>
+        <a:font script="Uigh" typeface="Microsoft Uighur"/>
+        <a:font script="Geor" typeface="Sylfaen"/>
+      </a:minorFont>
+    </a:fontScheme>
+    <a:fmtScheme name="Office">
+      <a:fillStyleLst>
+        <a:solidFill>
+          <a:schemeClr val="phClr"/>
+        </a:solidFill>
+        <a:gradFill rotWithShape="1">
+          <a:gsLst>
+            <a:gs pos="0">
+              <a:schemeClr val="phClr">
+                <a:tint val="50000"/>
+                <a:satMod val="300000"/>
+              </a:schemeClr>
+            </a:gs>
+            <a:gs pos="35000">
+              <a:schemeClr val="phClr">
+                <a:tint val="37000"/>
+                <a:satMod val="300000"/>
+              </a:schemeClr>
+            </a:gs>
+            <a:gs pos="100000">
+              <a:schemeClr val="phClr">
+                <a:tint val="15000"/>
+                <a:satMod val="350000"/>
+              </a:schemeClr>
+            </a:gs>
+          </a:gsLst>
+          <a:lin ang="16200000" scaled="1"/>
+        </a:gradFill>
+        <a:gradFill rotWithShape="1">
+          <a:gsLst>
+            <a:gs pos="0">
+              <a:schemeClr val="phClr">
+                <a:tint val="100000"/>
+                <a:shade val="100000"/>
+                <a:satMod val="130000"/>
+              </a:schemeClr>
+            </a:gs>
+            <a:gs pos="100000">
+              <a:schemeClr val="phClr">
+                <a:tint val="50000"/>
+                <a:shade val="100000"/>
+                <a:satMod val="350000"/>
+              </a:schemeClr>
+            </a:gs>
+          </a:gsLst>
+          <a:lin ang="16200000" scaled="0"/>
+        </a:gradFill>
+      </a:fillStyleLst>
+      <a:lnStyleLst>
+        <a:ln w="9525" cap="flat" cmpd="sng" algn="ctr">
+          <a:solidFill>
+            <a:schemeClr val="phClr">
+              <a:shade val="95000"/>
+              <a:satMod val="105000"/>
+            </a:schemeClr>
+          </a:solidFill>
+          <a:prstDash val="solid"/>
+        </a:ln>
+        <a:ln w="25400" cap="flat" cmpd="sng" algn="ctr">
+          <a:solidFill>
+            <a:schemeClr val="phClr"/>
+          </a:solidFill>
+          <a:prstDash val="solid"/>
+        </a:ln>
+        <a:ln w="38100" cap="flat" cmpd="sng" algn="ctr">
+          <a:solidFill>
+            <a:schemeClr val="phClr"/>
+          </a:solidFill>
+          <a:prstDash val="solid"/>
+        </a:ln>
+      </a:lnStyleLst>
+      <a:effectStyleLst>
+        <a:effectStyle>
+          <a:effectLst>
+            <a:outerShdw blurRad="40000" dist="20000" dir="5400000" rotWithShape="0">
+              <a:srgbClr val="000000">
+                <a:alpha val="38000"/>
+              </a:srgbClr>
+            </a:outerShdw>
+          </a:effectLst>
+        </a:effectStyle>
+        <a:effectStyle>
+          <a:effectLst>
+            <a:outerShdw blurRad="40000" dist="23000" dir="5400000" rotWithShape="0">
+              <a:srgbClr val="000000">
+                <a:alpha val="35000"/>
+              </a:srgbClr>
+            </a:outerShdw>
+          </a:effectLst>
+        </a:effectStyle>
+        <a:effectStyle>
+          <a:effectLst>
+            <a:outerShdw blurRad="40000" dist="23000" dir="5400000" rotWithShape="0">
+              <a:srgbClr val="000000">
+                <a:alpha val="35000"/>
+              </a:srgbClr>
+            </a:outerShdw>
+          </a:effectLst>
+          <a:scene3d>
+            <a:camera prst="orthographicFront">
+              <a:rot lat="0" lon="0" rev="0"/>
+            </a:camera>
+            <a:lightRig rig="threePt" dir="t">
+              <a:rot lat="0" lon="0" rev="1200000"/>
+            </a:lightRig>
+          </a:scene3d>
+          <a:sp3d>
+            <a:bevelT w="63500" h="25400"/>
+          </a:sp3d>
+        </a:effectStyle>
+      </a:effectStyleLst>
+      <a:bgFillStyleLst>
+        <a:solidFill>
+          <a:schemeClr val="phClr"/>
+        </a:solidFill>
+        <a:gradFill rotWithShape="1">
+          <a:gsLst>
+            <a:gs pos="0">
+              <a:schemeClr val="phClr">
+                <a:tint val="40000"/>
+                <a:satMod val="350000"/>
+              </a:schemeClr>
+            </a:gs>
+            <a:gs pos="40000">
+              <a:schemeClr val="phClr">
+                <a:tint val="45000"/>
+                <a:shade val="99000"/>
+                <a:satMod val="350000"/>
+              </a:schemeClr>
+            </a:gs>
+            <a:gs pos="100000">
+              <a:schemeClr val="phClr">
+                <a:shade val="20000"/>
+                <a:satMod val="255000"/>
+              </a:schemeClr>
+            </a:gs>
+          </a:gsLst>
+          <a:path path="circle">
+            <a:fillToRect l="50000" t="-80000" r="50000" b="180000"/>
+          </a:path>
+        </a:gradFill>
+        <a:gradFill rotWithShape="1">
+          <a:gsLst>
+            <a:gs pos="0">
+              <a:schemeClr val="phClr">
+                <a:tint val="80000"/>
+                <a:satMod val="300000"/>
+              </a:schemeClr>
+            </a:gs>
+            <a:gs pos="100000">
+              <a:schemeClr val="phClr">
+                <a:shade val="30000"/>
+                <a:satMod val="200000"/>
+              </a:schemeClr>
+            </a:gs>
+          </a:gsLst>
+          <a:path path="circle">
+            <a:fillToRect l="50000" t="50000" r="50000" b="50000"/>
+          </a:path>
+        </a:gradFill>
+      </a:bgFillStyleLst>
+    </a:fmtScheme>
+  </a:themeElements>
+</a:theme>
+</file>
+
+<file path=ppt/theme/theme2.xml><?xml version="1.0" encoding="utf-8"?>
 <a:theme xmlns:a="http://schemas.openxmlformats.org/drawingml/2006/main" xmlns:r="http://schemas.openxmlformats.org/officeDocument/2006/relationships" name="TUBraunschweig_PPT2007_Folienpool_pptx">
   <a:themeElements>
     <a:clrScheme name="TU Braunschweig">
@@ -14294,283 +14840,4 @@
     </a:fmtScheme>
   </a:themeElements>
 </a:theme>
-</file>
-
-<file path=ppt/theme/theme2.xml><?xml version="1.0" encoding="utf-8"?>
-<a:theme xmlns:a="http://schemas.openxmlformats.org/drawingml/2006/main" xmlns:r="http://schemas.openxmlformats.org/officeDocument/2006/relationships">
-  <a:themeElements>
-    <a:clrScheme name="Default">
-      <a:dk1>
-        <a:srgbClr val="000000"/>
-      </a:dk1>
-      <a:lt1>
-        <a:srgbClr val="FFFFFF"/>
-      </a:lt1>
-      <a:dk2>
-        <a:srgbClr val="158158"/>
-      </a:dk2>
-      <a:lt2>
-        <a:srgbClr val="F3F3F3"/>
-      </a:lt2>
-      <a:accent1>
-        <a:srgbClr val="058DC7"/>
-      </a:accent1>
-      <a:accent2>
-        <a:srgbClr val="50B432"/>
-      </a:accent2>
-      <a:accent3>
-        <a:srgbClr val="ED561B"/>
-      </a:accent3>
-      <a:accent4>
-        <a:srgbClr val="EDEF00"/>
-      </a:accent4>
-      <a:accent5>
-        <a:srgbClr val="24CBE5"/>
-      </a:accent5>
-      <a:accent6>
-        <a:srgbClr val="64E572"/>
-      </a:accent6>
-      <a:hlink>
-        <a:srgbClr val="2200CC"/>
-      </a:hlink>
-      <a:folHlink>
-        <a:srgbClr val="551A8B"/>
-      </a:folHlink>
-    </a:clrScheme>
-    <a:fontScheme name="Office">
-      <a:majorFont>
-        <a:latin typeface="Arial"/>
-        <a:ea typeface=""/>
-        <a:cs typeface=""/>
-        <a:font script="Jpan" typeface="ＭＳ Ｐゴシック"/>
-        <a:font script="Hang" typeface="맑은 고딕"/>
-        <a:font script="Hans" typeface="宋体"/>
-        <a:font script="Hant" typeface="新細明體"/>
-        <a:font script="Arab" typeface="Times New Roman"/>
-        <a:font script="Hebr" typeface="Times New Roman"/>
-        <a:font script="Thai" typeface="Angsana New"/>
-        <a:font script="Ethi" typeface="Nyala"/>
-        <a:font script="Beng" typeface="Vrinda"/>
-        <a:font script="Gujr" typeface="Shruti"/>
-        <a:font script="Khmr" typeface="MoolBoran"/>
-        <a:font script="Knda" typeface="Tunga"/>
-        <a:font script="Guru" typeface="Raavi"/>
-        <a:font script="Cans" typeface="Euphemia"/>
-        <a:font script="Cher" typeface="Plantagenet Cherokee"/>
-        <a:font script="Yiii" typeface="Microsoft Yi Baiti"/>
-        <a:font script="Tibt" typeface="Microsoft Himalaya"/>
-        <a:font script="Thaa" typeface="MV Boli"/>
-        <a:font script="Deva" typeface="Mangal"/>
-        <a:font script="Telu" typeface="Gautami"/>
-        <a:font script="Taml" typeface="Latha"/>
-        <a:font script="Syrc" typeface="Estrangelo Edessa"/>
-        <a:font script="Orya" typeface="Kalinga"/>
-        <a:font script="Mlym" typeface="Kartika"/>
-        <a:font script="Laoo" typeface="DokChampa"/>
-        <a:font script="Sinh" typeface="Iskoola Pota"/>
-        <a:font script="Mong" typeface="Mongolian Baiti"/>
-        <a:font script="Viet" typeface="Times New Roman"/>
-        <a:font script="Uigh" typeface="Microsoft Uighur"/>
-        <a:font script="Geor" typeface="Sylfaen"/>
-      </a:majorFont>
-      <a:minorFont>
-        <a:latin typeface="Arial"/>
-        <a:ea typeface=""/>
-        <a:cs typeface=""/>
-        <a:font script="Jpan" typeface="ＭＳ Ｐゴシック"/>
-        <a:font script="Hang" typeface="맑은 고딕"/>
-        <a:font script="Hans" typeface="宋体"/>
-        <a:font script="Hant" typeface="新細明體"/>
-        <a:font script="Arab" typeface="Arial"/>
-        <a:font script="Hebr" typeface="Arial"/>
-        <a:font script="Thai" typeface="Cordia New"/>
-        <a:font script="Ethi" typeface="Nyala"/>
-        <a:font script="Beng" typeface="Vrinda"/>
-        <a:font script="Gujr" typeface="Shruti"/>
-        <a:font script="Khmr" typeface="DaunPenh"/>
-        <a:font script="Knda" typeface="Tunga"/>
-        <a:font script="Guru" typeface="Raavi"/>
-        <a:font script="Cans" typeface="Euphemia"/>
-        <a:font script="Cher" typeface="Plantagenet Cherokee"/>
-        <a:font script="Yiii" typeface="Microsoft Yi Baiti"/>
-        <a:font script="Tibt" typeface="Microsoft Himalaya"/>
-        <a:font script="Thaa" typeface="MV Boli"/>
-        <a:font script="Deva" typeface="Mangal"/>
-        <a:font script="Telu" typeface="Gautami"/>
-        <a:font script="Taml" typeface="Latha"/>
-        <a:font script="Syrc" typeface="Estrangelo Edessa"/>
-        <a:font script="Orya" typeface="Kalinga"/>
-        <a:font script="Mlym" typeface="Kartika"/>
-        <a:font script="Laoo" typeface="DokChampa"/>
-        <a:font script="Sinh" typeface="Iskoola Pota"/>
-        <a:font script="Mong" typeface="Mongolian Baiti"/>
-        <a:font script="Viet" typeface="Arial"/>
-        <a:font script="Uigh" typeface="Microsoft Uighur"/>
-        <a:font script="Geor" typeface="Sylfaen"/>
-      </a:minorFont>
-    </a:fontScheme>
-    <a:fmtScheme name="Office">
-      <a:fillStyleLst>
-        <a:solidFill>
-          <a:schemeClr val="phClr"/>
-        </a:solidFill>
-        <a:gradFill rotWithShape="1">
-          <a:gsLst>
-            <a:gs pos="0">
-              <a:schemeClr val="phClr">
-                <a:tint val="50000"/>
-                <a:satMod val="300000"/>
-              </a:schemeClr>
-            </a:gs>
-            <a:gs pos="35000">
-              <a:schemeClr val="phClr">
-                <a:tint val="37000"/>
-                <a:satMod val="300000"/>
-              </a:schemeClr>
-            </a:gs>
-            <a:gs pos="100000">
-              <a:schemeClr val="phClr">
-                <a:tint val="15000"/>
-                <a:satMod val="350000"/>
-              </a:schemeClr>
-            </a:gs>
-          </a:gsLst>
-          <a:lin ang="16200000" scaled="1"/>
-        </a:gradFill>
-        <a:gradFill rotWithShape="1">
-          <a:gsLst>
-            <a:gs pos="0">
-              <a:schemeClr val="phClr">
-                <a:tint val="100000"/>
-                <a:shade val="100000"/>
-                <a:satMod val="130000"/>
-              </a:schemeClr>
-            </a:gs>
-            <a:gs pos="100000">
-              <a:schemeClr val="phClr">
-                <a:tint val="50000"/>
-                <a:shade val="100000"/>
-                <a:satMod val="350000"/>
-              </a:schemeClr>
-            </a:gs>
-          </a:gsLst>
-          <a:lin ang="16200000" scaled="0"/>
-        </a:gradFill>
-      </a:fillStyleLst>
-      <a:lnStyleLst>
-        <a:ln w="9525" cap="flat" cmpd="sng" algn="ctr">
-          <a:solidFill>
-            <a:schemeClr val="phClr">
-              <a:shade val="95000"/>
-              <a:satMod val="105000"/>
-            </a:schemeClr>
-          </a:solidFill>
-          <a:prstDash val="solid"/>
-        </a:ln>
-        <a:ln w="25400" cap="flat" cmpd="sng" algn="ctr">
-          <a:solidFill>
-            <a:schemeClr val="phClr"/>
-          </a:solidFill>
-          <a:prstDash val="solid"/>
-        </a:ln>
-        <a:ln w="38100" cap="flat" cmpd="sng" algn="ctr">
-          <a:solidFill>
-            <a:schemeClr val="phClr"/>
-          </a:solidFill>
-          <a:prstDash val="solid"/>
-        </a:ln>
-      </a:lnStyleLst>
-      <a:effectStyleLst>
-        <a:effectStyle>
-          <a:effectLst>
-            <a:outerShdw blurRad="40000" dist="20000" dir="5400000" rotWithShape="0">
-              <a:srgbClr val="000000">
-                <a:alpha val="38000"/>
-              </a:srgbClr>
-            </a:outerShdw>
-          </a:effectLst>
-        </a:effectStyle>
-        <a:effectStyle>
-          <a:effectLst>
-            <a:outerShdw blurRad="40000" dist="23000" dir="5400000" rotWithShape="0">
-              <a:srgbClr val="000000">
-                <a:alpha val="35000"/>
-              </a:srgbClr>
-            </a:outerShdw>
-          </a:effectLst>
-        </a:effectStyle>
-        <a:effectStyle>
-          <a:effectLst>
-            <a:outerShdw blurRad="40000" dist="23000" dir="5400000" rotWithShape="0">
-              <a:srgbClr val="000000">
-                <a:alpha val="35000"/>
-              </a:srgbClr>
-            </a:outerShdw>
-          </a:effectLst>
-          <a:scene3d>
-            <a:camera prst="orthographicFront">
-              <a:rot lat="0" lon="0" rev="0"/>
-            </a:camera>
-            <a:lightRig rig="threePt" dir="t">
-              <a:rot lat="0" lon="0" rev="1200000"/>
-            </a:lightRig>
-          </a:scene3d>
-          <a:sp3d>
-            <a:bevelT w="63500" h="25400"/>
-          </a:sp3d>
-        </a:effectStyle>
-      </a:effectStyleLst>
-      <a:bgFillStyleLst>
-        <a:solidFill>
-          <a:schemeClr val="phClr"/>
-        </a:solidFill>
-        <a:gradFill rotWithShape="1">
-          <a:gsLst>
-            <a:gs pos="0">
-              <a:schemeClr val="phClr">
-                <a:tint val="40000"/>
-                <a:satMod val="350000"/>
-              </a:schemeClr>
-            </a:gs>
-            <a:gs pos="40000">
-              <a:schemeClr val="phClr">
-                <a:tint val="45000"/>
-                <a:shade val="99000"/>
-                <a:satMod val="350000"/>
-              </a:schemeClr>
-            </a:gs>
-            <a:gs pos="100000">
-              <a:schemeClr val="phClr">
-                <a:shade val="20000"/>
-                <a:satMod val="255000"/>
-              </a:schemeClr>
-            </a:gs>
-          </a:gsLst>
-          <a:path path="circle">
-            <a:fillToRect l="50000" t="-80000" r="50000" b="180000"/>
-          </a:path>
-        </a:gradFill>
-        <a:gradFill rotWithShape="1">
-          <a:gsLst>
-            <a:gs pos="0">
-              <a:schemeClr val="phClr">
-                <a:tint val="80000"/>
-                <a:satMod val="300000"/>
-              </a:schemeClr>
-            </a:gs>
-            <a:gs pos="100000">
-              <a:schemeClr val="phClr">
-                <a:shade val="30000"/>
-                <a:satMod val="200000"/>
-              </a:schemeClr>
-            </a:gs>
-          </a:gsLst>
-          <a:path path="circle">
-            <a:fillToRect l="50000" t="50000" r="50000" b="50000"/>
-          </a:path>
-        </a:gradFill>
-      </a:bgFillStyleLst>
-    </a:fmtScheme>
-  </a:themeElements>
-</a:theme>
 </file>
</xml_diff>

<commit_message>
corrected wrong lasson enum
</commit_message>
<xml_diff>
--- a/slides/03_arrays_loops.pptx
+++ b/slides/03_arrays_loops.pptx
@@ -9997,7 +9997,7 @@
             </a:pPr>
             <a:r>
               <a:rPr lang="de"/>
-              <a:t>02 - Arrays und Schleifen</a:t>
+              <a:t>03 - Arrays und Schleifen</a:t>
             </a:r>
             <a:endParaRPr/>
           </a:p>
@@ -14324,6 +14324,285 @@
 </file>
 
 <file path=ppt/theme/theme1.xml><?xml version="1.0" encoding="utf-8"?>
+<a:theme xmlns:a="http://schemas.openxmlformats.org/drawingml/2006/main" xmlns:r="http://schemas.openxmlformats.org/officeDocument/2006/relationships">
+  <a:themeElements>
+    <a:clrScheme name="Default">
+      <a:dk1>
+        <a:srgbClr val="000000"/>
+      </a:dk1>
+      <a:lt1>
+        <a:srgbClr val="FFFFFF"/>
+      </a:lt1>
+      <a:dk2>
+        <a:srgbClr val="158158"/>
+      </a:dk2>
+      <a:lt2>
+        <a:srgbClr val="F3F3F3"/>
+      </a:lt2>
+      <a:accent1>
+        <a:srgbClr val="058DC7"/>
+      </a:accent1>
+      <a:accent2>
+        <a:srgbClr val="50B432"/>
+      </a:accent2>
+      <a:accent3>
+        <a:srgbClr val="ED561B"/>
+      </a:accent3>
+      <a:accent4>
+        <a:srgbClr val="EDEF00"/>
+      </a:accent4>
+      <a:accent5>
+        <a:srgbClr val="24CBE5"/>
+      </a:accent5>
+      <a:accent6>
+        <a:srgbClr val="64E572"/>
+      </a:accent6>
+      <a:hlink>
+        <a:srgbClr val="2200CC"/>
+      </a:hlink>
+      <a:folHlink>
+        <a:srgbClr val="551A8B"/>
+      </a:folHlink>
+    </a:clrScheme>
+    <a:fontScheme name="Office">
+      <a:majorFont>
+        <a:latin typeface="Arial"/>
+        <a:ea typeface=""/>
+        <a:cs typeface=""/>
+        <a:font script="Jpan" typeface="ＭＳ Ｐゴシック"/>
+        <a:font script="Hang" typeface="맑은 고딕"/>
+        <a:font script="Hans" typeface="宋体"/>
+        <a:font script="Hant" typeface="新細明體"/>
+        <a:font script="Arab" typeface="Times New Roman"/>
+        <a:font script="Hebr" typeface="Times New Roman"/>
+        <a:font script="Thai" typeface="Angsana New"/>
+        <a:font script="Ethi" typeface="Nyala"/>
+        <a:font script="Beng" typeface="Vrinda"/>
+        <a:font script="Gujr" typeface="Shruti"/>
+        <a:font script="Khmr" typeface="MoolBoran"/>
+        <a:font script="Knda" typeface="Tunga"/>
+        <a:font script="Guru" typeface="Raavi"/>
+        <a:font script="Cans" typeface="Euphemia"/>
+        <a:font script="Cher" typeface="Plantagenet Cherokee"/>
+        <a:font script="Yiii" typeface="Microsoft Yi Baiti"/>
+        <a:font script="Tibt" typeface="Microsoft Himalaya"/>
+        <a:font script="Thaa" typeface="MV Boli"/>
+        <a:font script="Deva" typeface="Mangal"/>
+        <a:font script="Telu" typeface="Gautami"/>
+        <a:font script="Taml" typeface="Latha"/>
+        <a:font script="Syrc" typeface="Estrangelo Edessa"/>
+        <a:font script="Orya" typeface="Kalinga"/>
+        <a:font script="Mlym" typeface="Kartika"/>
+        <a:font script="Laoo" typeface="DokChampa"/>
+        <a:font script="Sinh" typeface="Iskoola Pota"/>
+        <a:font script="Mong" typeface="Mongolian Baiti"/>
+        <a:font script="Viet" typeface="Times New Roman"/>
+        <a:font script="Uigh" typeface="Microsoft Uighur"/>
+        <a:font script="Geor" typeface="Sylfaen"/>
+      </a:majorFont>
+      <a:minorFont>
+        <a:latin typeface="Arial"/>
+        <a:ea typeface=""/>
+        <a:cs typeface=""/>
+        <a:font script="Jpan" typeface="ＭＳ Ｐゴシック"/>
+        <a:font script="Hang" typeface="맑은 고딕"/>
+        <a:font script="Hans" typeface="宋体"/>
+        <a:font script="Hant" typeface="新細明體"/>
+        <a:font script="Arab" typeface="Arial"/>
+        <a:font script="Hebr" typeface="Arial"/>
+        <a:font script="Thai" typeface="Cordia New"/>
+        <a:font script="Ethi" typeface="Nyala"/>
+        <a:font script="Beng" typeface="Vrinda"/>
+        <a:font script="Gujr" typeface="Shruti"/>
+        <a:font script="Khmr" typeface="DaunPenh"/>
+        <a:font script="Knda" typeface="Tunga"/>
+        <a:font script="Guru" typeface="Raavi"/>
+        <a:font script="Cans" typeface="Euphemia"/>
+        <a:font script="Cher" typeface="Plantagenet Cherokee"/>
+        <a:font script="Yiii" typeface="Microsoft Yi Baiti"/>
+        <a:font script="Tibt" typeface="Microsoft Himalaya"/>
+        <a:font script="Thaa" typeface="MV Boli"/>
+        <a:font script="Deva" typeface="Mangal"/>
+        <a:font script="Telu" typeface="Gautami"/>
+        <a:font script="Taml" typeface="Latha"/>
+        <a:font script="Syrc" typeface="Estrangelo Edessa"/>
+        <a:font script="Orya" typeface="Kalinga"/>
+        <a:font script="Mlym" typeface="Kartika"/>
+        <a:font script="Laoo" typeface="DokChampa"/>
+        <a:font script="Sinh" typeface="Iskoola Pota"/>
+        <a:font script="Mong" typeface="Mongolian Baiti"/>
+        <a:font script="Viet" typeface="Arial"/>
+        <a:font script="Uigh" typeface="Microsoft Uighur"/>
+        <a:font script="Geor" typeface="Sylfaen"/>
+      </a:minorFont>
+    </a:fontScheme>
+    <a:fmtScheme name="Office">
+      <a:fillStyleLst>
+        <a:solidFill>
+          <a:schemeClr val="phClr"/>
+        </a:solidFill>
+        <a:gradFill rotWithShape="1">
+          <a:gsLst>
+            <a:gs pos="0">
+              <a:schemeClr val="phClr">
+                <a:tint val="50000"/>
+                <a:satMod val="300000"/>
+              </a:schemeClr>
+            </a:gs>
+            <a:gs pos="35000">
+              <a:schemeClr val="phClr">
+                <a:tint val="37000"/>
+                <a:satMod val="300000"/>
+              </a:schemeClr>
+            </a:gs>
+            <a:gs pos="100000">
+              <a:schemeClr val="phClr">
+                <a:tint val="15000"/>
+                <a:satMod val="350000"/>
+              </a:schemeClr>
+            </a:gs>
+          </a:gsLst>
+          <a:lin ang="16200000" scaled="1"/>
+        </a:gradFill>
+        <a:gradFill rotWithShape="1">
+          <a:gsLst>
+            <a:gs pos="0">
+              <a:schemeClr val="phClr">
+                <a:tint val="100000"/>
+                <a:shade val="100000"/>
+                <a:satMod val="130000"/>
+              </a:schemeClr>
+            </a:gs>
+            <a:gs pos="100000">
+              <a:schemeClr val="phClr">
+                <a:tint val="50000"/>
+                <a:shade val="100000"/>
+                <a:satMod val="350000"/>
+              </a:schemeClr>
+            </a:gs>
+          </a:gsLst>
+          <a:lin ang="16200000" scaled="0"/>
+        </a:gradFill>
+      </a:fillStyleLst>
+      <a:lnStyleLst>
+        <a:ln w="9525" cap="flat" cmpd="sng" algn="ctr">
+          <a:solidFill>
+            <a:schemeClr val="phClr">
+              <a:shade val="95000"/>
+              <a:satMod val="105000"/>
+            </a:schemeClr>
+          </a:solidFill>
+          <a:prstDash val="solid"/>
+        </a:ln>
+        <a:ln w="25400" cap="flat" cmpd="sng" algn="ctr">
+          <a:solidFill>
+            <a:schemeClr val="phClr"/>
+          </a:solidFill>
+          <a:prstDash val="solid"/>
+        </a:ln>
+        <a:ln w="38100" cap="flat" cmpd="sng" algn="ctr">
+          <a:solidFill>
+            <a:schemeClr val="phClr"/>
+          </a:solidFill>
+          <a:prstDash val="solid"/>
+        </a:ln>
+      </a:lnStyleLst>
+      <a:effectStyleLst>
+        <a:effectStyle>
+          <a:effectLst>
+            <a:outerShdw blurRad="40000" dist="20000" dir="5400000" rotWithShape="0">
+              <a:srgbClr val="000000">
+                <a:alpha val="38000"/>
+              </a:srgbClr>
+            </a:outerShdw>
+          </a:effectLst>
+        </a:effectStyle>
+        <a:effectStyle>
+          <a:effectLst>
+            <a:outerShdw blurRad="40000" dist="23000" dir="5400000" rotWithShape="0">
+              <a:srgbClr val="000000">
+                <a:alpha val="35000"/>
+              </a:srgbClr>
+            </a:outerShdw>
+          </a:effectLst>
+        </a:effectStyle>
+        <a:effectStyle>
+          <a:effectLst>
+            <a:outerShdw blurRad="40000" dist="23000" dir="5400000" rotWithShape="0">
+              <a:srgbClr val="000000">
+                <a:alpha val="35000"/>
+              </a:srgbClr>
+            </a:outerShdw>
+          </a:effectLst>
+          <a:scene3d>
+            <a:camera prst="orthographicFront">
+              <a:rot lat="0" lon="0" rev="0"/>
+            </a:camera>
+            <a:lightRig rig="threePt" dir="t">
+              <a:rot lat="0" lon="0" rev="1200000"/>
+            </a:lightRig>
+          </a:scene3d>
+          <a:sp3d>
+            <a:bevelT w="63500" h="25400"/>
+          </a:sp3d>
+        </a:effectStyle>
+      </a:effectStyleLst>
+      <a:bgFillStyleLst>
+        <a:solidFill>
+          <a:schemeClr val="phClr"/>
+        </a:solidFill>
+        <a:gradFill rotWithShape="1">
+          <a:gsLst>
+            <a:gs pos="0">
+              <a:schemeClr val="phClr">
+                <a:tint val="40000"/>
+                <a:satMod val="350000"/>
+              </a:schemeClr>
+            </a:gs>
+            <a:gs pos="40000">
+              <a:schemeClr val="phClr">
+                <a:tint val="45000"/>
+                <a:shade val="99000"/>
+                <a:satMod val="350000"/>
+              </a:schemeClr>
+            </a:gs>
+            <a:gs pos="100000">
+              <a:schemeClr val="phClr">
+                <a:shade val="20000"/>
+                <a:satMod val="255000"/>
+              </a:schemeClr>
+            </a:gs>
+          </a:gsLst>
+          <a:path path="circle">
+            <a:fillToRect l="50000" t="-80000" r="50000" b="180000"/>
+          </a:path>
+        </a:gradFill>
+        <a:gradFill rotWithShape="1">
+          <a:gsLst>
+            <a:gs pos="0">
+              <a:schemeClr val="phClr">
+                <a:tint val="80000"/>
+                <a:satMod val="300000"/>
+              </a:schemeClr>
+            </a:gs>
+            <a:gs pos="100000">
+              <a:schemeClr val="phClr">
+                <a:shade val="30000"/>
+                <a:satMod val="200000"/>
+              </a:schemeClr>
+            </a:gs>
+          </a:gsLst>
+          <a:path path="circle">
+            <a:fillToRect l="50000" t="50000" r="50000" b="50000"/>
+          </a:path>
+        </a:gradFill>
+      </a:bgFillStyleLst>
+    </a:fmtScheme>
+  </a:themeElements>
+</a:theme>
+</file>
+
+<file path=ppt/theme/theme2.xml><?xml version="1.0" encoding="utf-8"?>
 <a:theme xmlns:a="http://schemas.openxmlformats.org/drawingml/2006/main" xmlns:r="http://schemas.openxmlformats.org/officeDocument/2006/relationships" name="TUBraunschweig_PPT2007_Folienpool_pptx">
   <a:themeElements>
     <a:clrScheme name="TU Braunschweig">
@@ -14600,283 +14879,4 @@
     </a:fmtScheme>
   </a:themeElements>
 </a:theme>
-</file>
-
-<file path=ppt/theme/theme2.xml><?xml version="1.0" encoding="utf-8"?>
-<a:theme xmlns:a="http://schemas.openxmlformats.org/drawingml/2006/main" xmlns:r="http://schemas.openxmlformats.org/officeDocument/2006/relationships">
-  <a:themeElements>
-    <a:clrScheme name="Default">
-      <a:dk1>
-        <a:srgbClr val="000000"/>
-      </a:dk1>
-      <a:lt1>
-        <a:srgbClr val="FFFFFF"/>
-      </a:lt1>
-      <a:dk2>
-        <a:srgbClr val="158158"/>
-      </a:dk2>
-      <a:lt2>
-        <a:srgbClr val="F3F3F3"/>
-      </a:lt2>
-      <a:accent1>
-        <a:srgbClr val="058DC7"/>
-      </a:accent1>
-      <a:accent2>
-        <a:srgbClr val="50B432"/>
-      </a:accent2>
-      <a:accent3>
-        <a:srgbClr val="ED561B"/>
-      </a:accent3>
-      <a:accent4>
-        <a:srgbClr val="EDEF00"/>
-      </a:accent4>
-      <a:accent5>
-        <a:srgbClr val="24CBE5"/>
-      </a:accent5>
-      <a:accent6>
-        <a:srgbClr val="64E572"/>
-      </a:accent6>
-      <a:hlink>
-        <a:srgbClr val="2200CC"/>
-      </a:hlink>
-      <a:folHlink>
-        <a:srgbClr val="551A8B"/>
-      </a:folHlink>
-    </a:clrScheme>
-    <a:fontScheme name="Office">
-      <a:majorFont>
-        <a:latin typeface="Arial"/>
-        <a:ea typeface=""/>
-        <a:cs typeface=""/>
-        <a:font script="Jpan" typeface="ＭＳ Ｐゴシック"/>
-        <a:font script="Hang" typeface="맑은 고딕"/>
-        <a:font script="Hans" typeface="宋体"/>
-        <a:font script="Hant" typeface="新細明體"/>
-        <a:font script="Arab" typeface="Times New Roman"/>
-        <a:font script="Hebr" typeface="Times New Roman"/>
-        <a:font script="Thai" typeface="Angsana New"/>
-        <a:font script="Ethi" typeface="Nyala"/>
-        <a:font script="Beng" typeface="Vrinda"/>
-        <a:font script="Gujr" typeface="Shruti"/>
-        <a:font script="Khmr" typeface="MoolBoran"/>
-        <a:font script="Knda" typeface="Tunga"/>
-        <a:font script="Guru" typeface="Raavi"/>
-        <a:font script="Cans" typeface="Euphemia"/>
-        <a:font script="Cher" typeface="Plantagenet Cherokee"/>
-        <a:font script="Yiii" typeface="Microsoft Yi Baiti"/>
-        <a:font script="Tibt" typeface="Microsoft Himalaya"/>
-        <a:font script="Thaa" typeface="MV Boli"/>
-        <a:font script="Deva" typeface="Mangal"/>
-        <a:font script="Telu" typeface="Gautami"/>
-        <a:font script="Taml" typeface="Latha"/>
-        <a:font script="Syrc" typeface="Estrangelo Edessa"/>
-        <a:font script="Orya" typeface="Kalinga"/>
-        <a:font script="Mlym" typeface="Kartika"/>
-        <a:font script="Laoo" typeface="DokChampa"/>
-        <a:font script="Sinh" typeface="Iskoola Pota"/>
-        <a:font script="Mong" typeface="Mongolian Baiti"/>
-        <a:font script="Viet" typeface="Times New Roman"/>
-        <a:font script="Uigh" typeface="Microsoft Uighur"/>
-        <a:font script="Geor" typeface="Sylfaen"/>
-      </a:majorFont>
-      <a:minorFont>
-        <a:latin typeface="Arial"/>
-        <a:ea typeface=""/>
-        <a:cs typeface=""/>
-        <a:font script="Jpan" typeface="ＭＳ Ｐゴシック"/>
-        <a:font script="Hang" typeface="맑은 고딕"/>
-        <a:font script="Hans" typeface="宋体"/>
-        <a:font script="Hant" typeface="新細明體"/>
-        <a:font script="Arab" typeface="Arial"/>
-        <a:font script="Hebr" typeface="Arial"/>
-        <a:font script="Thai" typeface="Cordia New"/>
-        <a:font script="Ethi" typeface="Nyala"/>
-        <a:font script="Beng" typeface="Vrinda"/>
-        <a:font script="Gujr" typeface="Shruti"/>
-        <a:font script="Khmr" typeface="DaunPenh"/>
-        <a:font script="Knda" typeface="Tunga"/>
-        <a:font script="Guru" typeface="Raavi"/>
-        <a:font script="Cans" typeface="Euphemia"/>
-        <a:font script="Cher" typeface="Plantagenet Cherokee"/>
-        <a:font script="Yiii" typeface="Microsoft Yi Baiti"/>
-        <a:font script="Tibt" typeface="Microsoft Himalaya"/>
-        <a:font script="Thaa" typeface="MV Boli"/>
-        <a:font script="Deva" typeface="Mangal"/>
-        <a:font script="Telu" typeface="Gautami"/>
-        <a:font script="Taml" typeface="Latha"/>
-        <a:font script="Syrc" typeface="Estrangelo Edessa"/>
-        <a:font script="Orya" typeface="Kalinga"/>
-        <a:font script="Mlym" typeface="Kartika"/>
-        <a:font script="Laoo" typeface="DokChampa"/>
-        <a:font script="Sinh" typeface="Iskoola Pota"/>
-        <a:font script="Mong" typeface="Mongolian Baiti"/>
-        <a:font script="Viet" typeface="Arial"/>
-        <a:font script="Uigh" typeface="Microsoft Uighur"/>
-        <a:font script="Geor" typeface="Sylfaen"/>
-      </a:minorFont>
-    </a:fontScheme>
-    <a:fmtScheme name="Office">
-      <a:fillStyleLst>
-        <a:solidFill>
-          <a:schemeClr val="phClr"/>
-        </a:solidFill>
-        <a:gradFill rotWithShape="1">
-          <a:gsLst>
-            <a:gs pos="0">
-              <a:schemeClr val="phClr">
-                <a:tint val="50000"/>
-                <a:satMod val="300000"/>
-              </a:schemeClr>
-            </a:gs>
-            <a:gs pos="35000">
-              <a:schemeClr val="phClr">
-                <a:tint val="37000"/>
-                <a:satMod val="300000"/>
-              </a:schemeClr>
-            </a:gs>
-            <a:gs pos="100000">
-              <a:schemeClr val="phClr">
-                <a:tint val="15000"/>
-                <a:satMod val="350000"/>
-              </a:schemeClr>
-            </a:gs>
-          </a:gsLst>
-          <a:lin ang="16200000" scaled="1"/>
-        </a:gradFill>
-        <a:gradFill rotWithShape="1">
-          <a:gsLst>
-            <a:gs pos="0">
-              <a:schemeClr val="phClr">
-                <a:tint val="100000"/>
-                <a:shade val="100000"/>
-                <a:satMod val="130000"/>
-              </a:schemeClr>
-            </a:gs>
-            <a:gs pos="100000">
-              <a:schemeClr val="phClr">
-                <a:tint val="50000"/>
-                <a:shade val="100000"/>
-                <a:satMod val="350000"/>
-              </a:schemeClr>
-            </a:gs>
-          </a:gsLst>
-          <a:lin ang="16200000" scaled="0"/>
-        </a:gradFill>
-      </a:fillStyleLst>
-      <a:lnStyleLst>
-        <a:ln w="9525" cap="flat" cmpd="sng" algn="ctr">
-          <a:solidFill>
-            <a:schemeClr val="phClr">
-              <a:shade val="95000"/>
-              <a:satMod val="105000"/>
-            </a:schemeClr>
-          </a:solidFill>
-          <a:prstDash val="solid"/>
-        </a:ln>
-        <a:ln w="25400" cap="flat" cmpd="sng" algn="ctr">
-          <a:solidFill>
-            <a:schemeClr val="phClr"/>
-          </a:solidFill>
-          <a:prstDash val="solid"/>
-        </a:ln>
-        <a:ln w="38100" cap="flat" cmpd="sng" algn="ctr">
-          <a:solidFill>
-            <a:schemeClr val="phClr"/>
-          </a:solidFill>
-          <a:prstDash val="solid"/>
-        </a:ln>
-      </a:lnStyleLst>
-      <a:effectStyleLst>
-        <a:effectStyle>
-          <a:effectLst>
-            <a:outerShdw blurRad="40000" dist="20000" dir="5400000" rotWithShape="0">
-              <a:srgbClr val="000000">
-                <a:alpha val="38000"/>
-              </a:srgbClr>
-            </a:outerShdw>
-          </a:effectLst>
-        </a:effectStyle>
-        <a:effectStyle>
-          <a:effectLst>
-            <a:outerShdw blurRad="40000" dist="23000" dir="5400000" rotWithShape="0">
-              <a:srgbClr val="000000">
-                <a:alpha val="35000"/>
-              </a:srgbClr>
-            </a:outerShdw>
-          </a:effectLst>
-        </a:effectStyle>
-        <a:effectStyle>
-          <a:effectLst>
-            <a:outerShdw blurRad="40000" dist="23000" dir="5400000" rotWithShape="0">
-              <a:srgbClr val="000000">
-                <a:alpha val="35000"/>
-              </a:srgbClr>
-            </a:outerShdw>
-          </a:effectLst>
-          <a:scene3d>
-            <a:camera prst="orthographicFront">
-              <a:rot lat="0" lon="0" rev="0"/>
-            </a:camera>
-            <a:lightRig rig="threePt" dir="t">
-              <a:rot lat="0" lon="0" rev="1200000"/>
-            </a:lightRig>
-          </a:scene3d>
-          <a:sp3d>
-            <a:bevelT w="63500" h="25400"/>
-          </a:sp3d>
-        </a:effectStyle>
-      </a:effectStyleLst>
-      <a:bgFillStyleLst>
-        <a:solidFill>
-          <a:schemeClr val="phClr"/>
-        </a:solidFill>
-        <a:gradFill rotWithShape="1">
-          <a:gsLst>
-            <a:gs pos="0">
-              <a:schemeClr val="phClr">
-                <a:tint val="40000"/>
-                <a:satMod val="350000"/>
-              </a:schemeClr>
-            </a:gs>
-            <a:gs pos="40000">
-              <a:schemeClr val="phClr">
-                <a:tint val="45000"/>
-                <a:shade val="99000"/>
-                <a:satMod val="350000"/>
-              </a:schemeClr>
-            </a:gs>
-            <a:gs pos="100000">
-              <a:schemeClr val="phClr">
-                <a:shade val="20000"/>
-                <a:satMod val="255000"/>
-              </a:schemeClr>
-            </a:gs>
-          </a:gsLst>
-          <a:path path="circle">
-            <a:fillToRect l="50000" t="-80000" r="50000" b="180000"/>
-          </a:path>
-        </a:gradFill>
-        <a:gradFill rotWithShape="1">
-          <a:gsLst>
-            <a:gs pos="0">
-              <a:schemeClr val="phClr">
-                <a:tint val="80000"/>
-                <a:satMod val="300000"/>
-              </a:schemeClr>
-            </a:gs>
-            <a:gs pos="100000">
-              <a:schemeClr val="phClr">
-                <a:shade val="30000"/>
-                <a:satMod val="200000"/>
-              </a:schemeClr>
-            </a:gs>
-          </a:gsLst>
-          <a:path path="circle">
-            <a:fillToRect l="50000" t="50000" r="50000" b="50000"/>
-          </a:path>
-        </a:gradFill>
-      </a:bgFillStyleLst>
-    </a:fmtScheme>
-  </a:themeElements>
-</a:theme>
 </file>
</xml_diff>